<commit_message>
I have made changes to the progress report power point and tex files.
</commit_message>
<xml_diff>
--- a/Project Documents/Progress Report 2/Progress report.pptx
+++ b/Project Documents/Progress Report 2/Progress report.pptx
@@ -35,11 +35,9 @@
     <p:sldId id="280" r:id="rId29"/>
     <p:sldId id="281" r:id="rId30"/>
     <p:sldId id="282" r:id="rId31"/>
-    <p:sldId id="283" r:id="rId32"/>
-    <p:sldId id="284" r:id="rId33"/>
-    <p:sldId id="293" r:id="rId34"/>
-    <p:sldId id="276" r:id="rId35"/>
-    <p:sldId id="295" r:id="rId36"/>
+    <p:sldId id="293" r:id="rId32"/>
+    <p:sldId id="276" r:id="rId33"/>
+    <p:sldId id="295" r:id="rId34"/>
   </p:sldIdLst>
   <p:sldSz cx="12192000" cy="6858000"/>
   <p:notesSz cx="6858000" cy="9144000"/>
@@ -372,7 +370,7 @@
           <a:p>
             <a:fld id="{B17AFAAB-B546-45EA-83F1-D6961F00B077}" type="datetimeFigureOut">
               <a:rPr lang="en-US" smtClean="0"/>
-              <a:t>12/5/2016</a:t>
+              <a:t>2/14/2017</a:t>
             </a:fld>
             <a:endParaRPr lang="en-US"/>
           </a:p>
@@ -580,7 +578,7 @@
           <a:p>
             <a:fld id="{B17AFAAB-B546-45EA-83F1-D6961F00B077}" type="datetimeFigureOut">
               <a:rPr lang="en-US" smtClean="0"/>
-              <a:t>12/5/2016</a:t>
+              <a:t>2/14/2017</a:t>
             </a:fld>
             <a:endParaRPr lang="en-US"/>
           </a:p>
@@ -836,7 +834,7 @@
           <a:p>
             <a:fld id="{B17AFAAB-B546-45EA-83F1-D6961F00B077}" type="datetimeFigureOut">
               <a:rPr lang="en-US" smtClean="0"/>
-              <a:t>12/5/2016</a:t>
+              <a:t>2/14/2017</a:t>
             </a:fld>
             <a:endParaRPr lang="en-US"/>
           </a:p>
@@ -1010,7 +1008,7 @@
           <a:p>
             <a:fld id="{B17AFAAB-B546-45EA-83F1-D6961F00B077}" type="datetimeFigureOut">
               <a:rPr lang="en-US" smtClean="0"/>
-              <a:t>12/5/2016</a:t>
+              <a:t>2/14/2017</a:t>
             </a:fld>
             <a:endParaRPr lang="en-US"/>
           </a:p>
@@ -1353,7 +1351,7 @@
           <a:p>
             <a:fld id="{B17AFAAB-B546-45EA-83F1-D6961F00B077}" type="datetimeFigureOut">
               <a:rPr lang="en-US" smtClean="0"/>
-              <a:t>12/5/2016</a:t>
+              <a:t>2/14/2017</a:t>
             </a:fld>
             <a:endParaRPr lang="en-US"/>
           </a:p>
@@ -1628,7 +1626,7 @@
           <a:p>
             <a:fld id="{B17AFAAB-B546-45EA-83F1-D6961F00B077}" type="datetimeFigureOut">
               <a:rPr lang="en-US" smtClean="0"/>
-              <a:t>12/5/2016</a:t>
+              <a:t>2/14/2017</a:t>
             </a:fld>
             <a:endParaRPr lang="en-US"/>
           </a:p>
@@ -2007,7 +2005,7 @@
           <a:p>
             <a:fld id="{B17AFAAB-B546-45EA-83F1-D6961F00B077}" type="datetimeFigureOut">
               <a:rPr lang="en-US" smtClean="0"/>
-              <a:t>12/5/2016</a:t>
+              <a:t>2/14/2017</a:t>
             </a:fld>
             <a:endParaRPr lang="en-US"/>
           </a:p>
@@ -2125,7 +2123,7 @@
           <a:p>
             <a:fld id="{B17AFAAB-B546-45EA-83F1-D6961F00B077}" type="datetimeFigureOut">
               <a:rPr lang="en-US" smtClean="0"/>
-              <a:t>12/5/2016</a:t>
+              <a:t>2/14/2017</a:t>
             </a:fld>
             <a:endParaRPr lang="en-US"/>
           </a:p>
@@ -2296,7 +2294,7 @@
           <a:p>
             <a:fld id="{B17AFAAB-B546-45EA-83F1-D6961F00B077}" type="datetimeFigureOut">
               <a:rPr lang="en-US" smtClean="0"/>
-              <a:t>12/5/2016</a:t>
+              <a:t>2/14/2017</a:t>
             </a:fld>
             <a:endParaRPr lang="en-US"/>
           </a:p>
@@ -2650,7 +2648,7 @@
           <a:p>
             <a:fld id="{B17AFAAB-B546-45EA-83F1-D6961F00B077}" type="datetimeFigureOut">
               <a:rPr lang="en-US" smtClean="0"/>
-              <a:t>12/5/2016</a:t>
+              <a:t>2/14/2017</a:t>
             </a:fld>
             <a:endParaRPr lang="en-US"/>
           </a:p>
@@ -3032,7 +3030,7 @@
           <a:p>
             <a:fld id="{B17AFAAB-B546-45EA-83F1-D6961F00B077}" type="datetimeFigureOut">
               <a:rPr lang="en-US" smtClean="0"/>
-              <a:t>12/5/2016</a:t>
+              <a:t>2/14/2017</a:t>
             </a:fld>
             <a:endParaRPr lang="en-US"/>
           </a:p>
@@ -3319,7 +3317,7 @@
           <a:p>
             <a:fld id="{B17AFAAB-B546-45EA-83F1-D6961F00B077}" type="datetimeFigureOut">
               <a:rPr lang="en-US" smtClean="0"/>
-              <a:t>12/5/2016</a:t>
+              <a:t>2/14/2017</a:t>
             </a:fld>
             <a:endParaRPr lang="en-US"/>
           </a:p>
@@ -5743,7 +5741,7 @@
           <a:p>
             <a:r>
               <a:rPr lang="en-US" dirty="0"/>
-              <a:t>Week 3</a:t>
+              <a:t>Winter Week 1</a:t>
             </a:r>
           </a:p>
         </p:txBody>
@@ -5763,56 +5761,7 @@
           <a:bodyPr/>
           <a:lstStyle/>
           <a:p>
-            <a:r>
-              <a:rPr lang="en-US" dirty="0"/>
-              <a:t>Brainstorming ideas</a:t>
-            </a:r>
-          </a:p>
-          <a:p>
-            <a:r>
-              <a:rPr lang="en-US" dirty="0"/>
-              <a:t>Meeting with Patti</a:t>
-            </a:r>
-          </a:p>
-          <a:p>
-            <a:r>
-              <a:rPr lang="en-US" dirty="0"/>
-              <a:t>Another meeting with Patti and Jim</a:t>
-            </a:r>
-          </a:p>
-          <a:p>
-            <a:pPr lvl="1"/>
-            <a:r>
-              <a:rPr lang="en-US" dirty="0"/>
-              <a:t>Intro to Vrok.it</a:t>
-            </a:r>
-          </a:p>
-          <a:p>
-            <a:pPr lvl="1"/>
-            <a:r>
-              <a:rPr lang="en-US" dirty="0"/>
-              <a:t>Polygon reduction?</a:t>
-            </a:r>
-          </a:p>
-          <a:p>
-            <a:pPr lvl="1"/>
-            <a:r>
-              <a:rPr lang="en-US" dirty="0"/>
-              <a:t>Potential VR reduction?</a:t>
-            </a:r>
-          </a:p>
-          <a:p>
-            <a:r>
-              <a:rPr lang="en-US" dirty="0"/>
-              <a:t>Began idea of what we were doing.</a:t>
-            </a:r>
-          </a:p>
-          <a:p>
-            <a:pPr lvl="1"/>
-            <a:r>
-              <a:rPr lang="en-US" dirty="0"/>
-              <a:t>Nothing concrete…</a:t>
-            </a:r>
+            <a:endParaRPr lang="en-US" dirty="0"/>
           </a:p>
         </p:txBody>
       </p:sp>
@@ -5863,7 +5812,7 @@
           <a:p>
             <a:r>
               <a:rPr lang="en-US" dirty="0"/>
-              <a:t>Week 4</a:t>
+              <a:t>Winter Week 2</a:t>
             </a:r>
           </a:p>
         </p:txBody>
@@ -5882,45 +5831,6 @@
         <p:txBody>
           <a:bodyPr/>
           <a:lstStyle/>
-          <a:p>
-            <a:r>
-              <a:rPr lang="en-US" dirty="0"/>
-              <a:t>Problem statement assigned</a:t>
-            </a:r>
-          </a:p>
-          <a:p>
-            <a:pPr lvl="1"/>
-            <a:r>
-              <a:rPr lang="en-US" dirty="0"/>
-              <a:t>However, project not refined enough</a:t>
-            </a:r>
-          </a:p>
-          <a:p>
-            <a:r>
-              <a:rPr lang="en-US" dirty="0"/>
-              <a:t>Another conference call with Patti</a:t>
-            </a:r>
-          </a:p>
-          <a:p>
-            <a:pPr lvl="1"/>
-            <a:r>
-              <a:rPr lang="en-US" dirty="0"/>
-              <a:t>Working out more details</a:t>
-            </a:r>
-          </a:p>
-          <a:p>
-            <a:pPr lvl="1"/>
-            <a:r>
-              <a:rPr lang="en-US" dirty="0"/>
-              <a:t>Got in contact with Vrok.it creator, Kean</a:t>
-            </a:r>
-          </a:p>
-          <a:p>
-            <a:r>
-              <a:rPr lang="en-US" dirty="0"/>
-              <a:t>Still not enough information to begin problem statement</a:t>
-            </a:r>
-          </a:p>
           <a:p>
             <a:pPr marL="457200" lvl="1" indent="0">
               <a:buNone/>
@@ -5976,7 +5886,7 @@
           <a:p>
             <a:r>
               <a:rPr lang="en-US" dirty="0"/>
-              <a:t>Week 5</a:t>
+              <a:t>Winter Week 3</a:t>
             </a:r>
           </a:p>
         </p:txBody>
@@ -5996,43 +5906,7 @@
           <a:bodyPr/>
           <a:lstStyle/>
           <a:p>
-            <a:r>
-              <a:rPr lang="en-US" dirty="0"/>
-              <a:t>Had official meeting with Kean and Patti</a:t>
-            </a:r>
-          </a:p>
-          <a:p>
-            <a:pPr lvl="1"/>
-            <a:r>
-              <a:rPr lang="en-US" dirty="0"/>
-              <a:t>Enough information to finish problem statement</a:t>
-            </a:r>
-          </a:p>
-          <a:p>
-            <a:pPr lvl="1"/>
-            <a:r>
-              <a:rPr lang="en-US" dirty="0"/>
-              <a:t>More user focused</a:t>
-            </a:r>
-          </a:p>
-          <a:p>
-            <a:pPr lvl="1"/>
-            <a:r>
-              <a:rPr lang="en-US" dirty="0"/>
-              <a:t>Increasing performance if possible, but not optimizing</a:t>
-            </a:r>
-          </a:p>
-          <a:p>
-            <a:r>
-              <a:rPr lang="en-US" dirty="0"/>
-              <a:t>Viewer, VR content added in</a:t>
-            </a:r>
-          </a:p>
-          <a:p>
-            <a:r>
-              <a:rPr lang="en-US" dirty="0"/>
-              <a:t>Requirements document work begins</a:t>
-            </a:r>
+            <a:endParaRPr lang="en-US" dirty="0"/>
           </a:p>
         </p:txBody>
       </p:sp>
@@ -6083,7 +5957,7 @@
           <a:p>
             <a:r>
               <a:rPr lang="en-US" dirty="0"/>
-              <a:t>Week 6</a:t>
+              <a:t>Winter Week 4</a:t>
             </a:r>
           </a:p>
         </p:txBody>
@@ -6103,44 +5977,7 @@
           <a:bodyPr/>
           <a:lstStyle/>
           <a:p>
-            <a:r>
-              <a:rPr lang="en-US" dirty="0"/>
-              <a:t>Hard to meet with client</a:t>
-            </a:r>
-          </a:p>
-          <a:p>
-            <a:r>
-              <a:rPr lang="en-US" dirty="0"/>
-              <a:t>Wanted </a:t>
-            </a:r>
-            <a:r>
-              <a:rPr lang="en-US" dirty="0" err="1"/>
-              <a:t>Nels</a:t>
-            </a:r>
-            <a:r>
-              <a:rPr lang="en-US" dirty="0"/>
-              <a:t> to join the next meeting </a:t>
-            </a:r>
-          </a:p>
-          <a:p>
-            <a:pPr lvl="1"/>
-            <a:r>
-              <a:rPr lang="en-US" dirty="0"/>
-              <a:t>Help narrow scope more</a:t>
-            </a:r>
-          </a:p>
-          <a:p>
-            <a:pPr lvl="1"/>
-            <a:r>
-              <a:rPr lang="en-US" dirty="0"/>
-              <a:t>Help convey capstone intentions as well</a:t>
-            </a:r>
-          </a:p>
-          <a:p>
-            <a:r>
-              <a:rPr lang="en-US" dirty="0"/>
-              <a:t>Unable to get question answered due to Autodesk event</a:t>
-            </a:r>
+            <a:endParaRPr lang="en-US" dirty="0"/>
           </a:p>
         </p:txBody>
       </p:sp>
@@ -6191,7 +6028,7 @@
           <a:p>
             <a:r>
               <a:rPr lang="en-US" dirty="0"/>
-              <a:t>Week 7</a:t>
+              <a:t>Winter Week 5</a:t>
             </a:r>
           </a:p>
         </p:txBody>
@@ -6211,36 +6048,7 @@
           <a:bodyPr/>
           <a:lstStyle/>
           <a:p>
-            <a:r>
-              <a:rPr lang="en-US" dirty="0"/>
-              <a:t>Requirements Document draft finished</a:t>
-            </a:r>
-          </a:p>
-          <a:p>
-            <a:pPr lvl="1"/>
-            <a:r>
-              <a:rPr lang="en-US" dirty="0"/>
-              <a:t>Feedback received</a:t>
-            </a:r>
-          </a:p>
-          <a:p>
-            <a:pPr lvl="2"/>
-            <a:r>
-              <a:rPr lang="en-US" dirty="0"/>
-              <a:t>Needed to be more descriptive</a:t>
-            </a:r>
-          </a:p>
-          <a:p>
-            <a:r>
-              <a:rPr lang="en-US" dirty="0"/>
-              <a:t>Able to contact Patti and setup meeting</a:t>
-            </a:r>
-          </a:p>
-          <a:p>
-            <a:r>
-              <a:rPr lang="en-US" dirty="0"/>
-              <a:t>Tech review and requirements document final coincide</a:t>
-            </a:r>
+            <a:endParaRPr lang="en-US" dirty="0"/>
           </a:p>
         </p:txBody>
       </p:sp>
@@ -6350,7 +6158,7 @@
           <a:p>
             <a:r>
               <a:rPr lang="en-US" dirty="0"/>
-              <a:t>Week 8 </a:t>
+              <a:t>Winter Week 6</a:t>
             </a:r>
           </a:p>
         </p:txBody>
@@ -6439,218 +6247,6 @@
 </file>
 
 <file path=ppt/slides/slide31.xml><?xml version="1.0" encoding="utf-8"?>
-<p:sld xmlns:a="http://schemas.openxmlformats.org/drawingml/2006/main" xmlns:r="http://schemas.openxmlformats.org/officeDocument/2006/relationships" xmlns:p="http://schemas.openxmlformats.org/presentationml/2006/main">
-  <p:cSld>
-    <p:spTree>
-      <p:nvGrpSpPr>
-        <p:cNvPr id="1" name=""/>
-        <p:cNvGrpSpPr/>
-        <p:nvPr/>
-      </p:nvGrpSpPr>
-      <p:grpSpPr>
-        <a:xfrm>
-          <a:off x="0" y="0"/>
-          <a:ext cx="0" cy="0"/>
-          <a:chOff x="0" y="0"/>
-          <a:chExt cx="0" cy="0"/>
-        </a:xfrm>
-      </p:grpSpPr>
-      <p:sp>
-        <p:nvSpPr>
-          <p:cNvPr id="2" name="Title 1"/>
-          <p:cNvSpPr>
-            <a:spLocks noGrp="1"/>
-          </p:cNvSpPr>
-          <p:nvPr>
-            <p:ph type="title"/>
-          </p:nvPr>
-        </p:nvSpPr>
-        <p:spPr/>
-        <p:txBody>
-          <a:bodyPr/>
-          <a:lstStyle/>
-          <a:p>
-            <a:r>
-              <a:rPr lang="en-US" dirty="0"/>
-              <a:t>Week 9</a:t>
-            </a:r>
-          </a:p>
-        </p:txBody>
-      </p:sp>
-      <p:sp>
-        <p:nvSpPr>
-          <p:cNvPr id="3" name="Content Placeholder 2"/>
-          <p:cNvSpPr>
-            <a:spLocks noGrp="1"/>
-          </p:cNvSpPr>
-          <p:nvPr>
-            <p:ph idx="1"/>
-          </p:nvPr>
-        </p:nvSpPr>
-        <p:spPr/>
-        <p:txBody>
-          <a:bodyPr/>
-          <a:lstStyle/>
-          <a:p>
-            <a:r>
-              <a:rPr lang="en-US" dirty="0"/>
-              <a:t>Least productive week</a:t>
-            </a:r>
-          </a:p>
-          <a:p>
-            <a:r>
-              <a:rPr lang="en-US" dirty="0"/>
-              <a:t>Thanksgiving and travelling</a:t>
-            </a:r>
-          </a:p>
-          <a:p>
-            <a:r>
-              <a:rPr lang="en-US" dirty="0"/>
-              <a:t>Design Document due in the next week</a:t>
-            </a:r>
-          </a:p>
-          <a:p>
-            <a:pPr lvl="1"/>
-            <a:r>
-              <a:rPr lang="en-US" dirty="0"/>
-              <a:t>Documentation hard to decipher</a:t>
-            </a:r>
-          </a:p>
-          <a:p>
-            <a:pPr lvl="1"/>
-            <a:r>
-              <a:rPr lang="en-US" dirty="0"/>
-              <a:t>Not able to break down as a group</a:t>
-            </a:r>
-          </a:p>
-          <a:p>
-            <a:endParaRPr lang="en-US" dirty="0"/>
-          </a:p>
-        </p:txBody>
-      </p:sp>
-    </p:spTree>
-    <p:extLst>
-      <p:ext uri="{BB962C8B-B14F-4D97-AF65-F5344CB8AC3E}">
-        <p14:creationId xmlns:p14="http://schemas.microsoft.com/office/powerpoint/2010/main" val="4177011364"/>
-      </p:ext>
-    </p:extLst>
-  </p:cSld>
-  <p:clrMapOvr>
-    <a:masterClrMapping/>
-  </p:clrMapOvr>
-</p:sld>
-</file>
-
-<file path=ppt/slides/slide32.xml><?xml version="1.0" encoding="utf-8"?>
-<p:sld xmlns:a="http://schemas.openxmlformats.org/drawingml/2006/main" xmlns:r="http://schemas.openxmlformats.org/officeDocument/2006/relationships" xmlns:p="http://schemas.openxmlformats.org/presentationml/2006/main">
-  <p:cSld>
-    <p:spTree>
-      <p:nvGrpSpPr>
-        <p:cNvPr id="1" name=""/>
-        <p:cNvGrpSpPr/>
-        <p:nvPr/>
-      </p:nvGrpSpPr>
-      <p:grpSpPr>
-        <a:xfrm>
-          <a:off x="0" y="0"/>
-          <a:ext cx="0" cy="0"/>
-          <a:chOff x="0" y="0"/>
-          <a:chExt cx="0" cy="0"/>
-        </a:xfrm>
-      </p:grpSpPr>
-      <p:sp>
-        <p:nvSpPr>
-          <p:cNvPr id="2" name="Title 1"/>
-          <p:cNvSpPr>
-            <a:spLocks noGrp="1"/>
-          </p:cNvSpPr>
-          <p:nvPr>
-            <p:ph type="title"/>
-          </p:nvPr>
-        </p:nvSpPr>
-        <p:spPr/>
-        <p:txBody>
-          <a:bodyPr/>
-          <a:lstStyle/>
-          <a:p>
-            <a:r>
-              <a:rPr lang="en-US" dirty="0"/>
-              <a:t>Week 10</a:t>
-            </a:r>
-          </a:p>
-        </p:txBody>
-      </p:sp>
-      <p:sp>
-        <p:nvSpPr>
-          <p:cNvPr id="3" name="Content Placeholder 2"/>
-          <p:cNvSpPr>
-            <a:spLocks noGrp="1"/>
-          </p:cNvSpPr>
-          <p:nvPr>
-            <p:ph idx="1"/>
-          </p:nvPr>
-        </p:nvSpPr>
-        <p:spPr/>
-        <p:txBody>
-          <a:bodyPr/>
-          <a:lstStyle/>
-          <a:p>
-            <a:r>
-              <a:rPr lang="en-US" dirty="0"/>
-              <a:t>Lots of work conflict with other classes</a:t>
-            </a:r>
-          </a:p>
-          <a:p>
-            <a:r>
-              <a:rPr lang="en-US" dirty="0"/>
-              <a:t>Design document</a:t>
-            </a:r>
-          </a:p>
-          <a:p>
-            <a:pPr lvl="1"/>
-            <a:r>
-              <a:rPr lang="en-US" dirty="0"/>
-              <a:t>Still issues figuring out the IEEE document</a:t>
-            </a:r>
-          </a:p>
-          <a:p>
-            <a:pPr lvl="1"/>
-            <a:r>
-              <a:rPr lang="en-US" dirty="0"/>
-              <a:t>Talk with Kirsten and </a:t>
-            </a:r>
-            <a:r>
-              <a:rPr lang="en-US" dirty="0" err="1"/>
-              <a:t>Nels</a:t>
-            </a:r>
-            <a:r>
-              <a:rPr lang="en-US" dirty="0"/>
-              <a:t> helped</a:t>
-            </a:r>
-          </a:p>
-          <a:p>
-            <a:pPr lvl="1"/>
-            <a:r>
-              <a:rPr lang="en-US" dirty="0"/>
-              <a:t>Got good work done on the document</a:t>
-            </a:r>
-          </a:p>
-        </p:txBody>
-      </p:sp>
-    </p:spTree>
-    <p:extLst>
-      <p:ext uri="{BB962C8B-B14F-4D97-AF65-F5344CB8AC3E}">
-        <p14:creationId xmlns:p14="http://schemas.microsoft.com/office/powerpoint/2010/main" val="2146190001"/>
-      </p:ext>
-    </p:extLst>
-  </p:cSld>
-  <p:clrMapOvr>
-    <a:masterClrMapping/>
-  </p:clrMapOvr>
-</p:sld>
-</file>
-
-<file path=ppt/slides/slide33.xml><?xml version="1.0" encoding="utf-8"?>
 <p:sld xmlns:a="http://schemas.openxmlformats.org/drawingml/2006/main" xmlns:r="http://schemas.openxmlformats.org/officeDocument/2006/relationships" xmlns:p="http://schemas.openxmlformats.org/presentationml/2006/main">
   <p:cSld>
     <p:spTree>
@@ -7094,7 +6690,7 @@
 </p:sld>
 </file>
 
-<file path=ppt/slides/slide34.xml><?xml version="1.0" encoding="utf-8"?>
+<file path=ppt/slides/slide32.xml><?xml version="1.0" encoding="utf-8"?>
 <p:sld xmlns:a="http://schemas.openxmlformats.org/drawingml/2006/main" xmlns:r="http://schemas.openxmlformats.org/officeDocument/2006/relationships" xmlns:p="http://schemas.openxmlformats.org/presentationml/2006/main">
   <p:cSld>
     <p:spTree>
@@ -7217,7 +6813,7 @@
 </p:sld>
 </file>
 
-<file path=ppt/slides/slide35.xml><?xml version="1.0" encoding="utf-8"?>
+<file path=ppt/slides/slide33.xml><?xml version="1.0" encoding="utf-8"?>
 <p:sld xmlns:a="http://schemas.openxmlformats.org/drawingml/2006/main" xmlns:r="http://schemas.openxmlformats.org/officeDocument/2006/relationships" xmlns:p="http://schemas.openxmlformats.org/presentationml/2006/main">
   <p:cSld>
     <p:spTree>
@@ -7272,10 +6868,24 @@
           <a:lstStyle/>
           <a:p>
             <a:r>
-              <a:rPr lang="en-US" dirty="0"/>
+              <a:rPr lang="en-US" dirty="0">
+                <a:hlinkClick r:id="rId2"/>
+              </a:rPr>
               <a:t>https://developer.autodesk.com/</a:t>
             </a:r>
             <a:endParaRPr lang="en-US" dirty="0"/>
+          </a:p>
+          <a:p>
+            <a:r>
+              <a:rPr lang="en-US" dirty="0"/>
+              <a:t>https://github.com/KeanW/vrok-it</a:t>
+            </a:r>
+          </a:p>
+          <a:p>
+            <a:r>
+              <a:rPr lang="en-US" dirty="0"/>
+              <a:t>https://github.com/Autodesk-Forge/model.derivative-nodejs-sample</a:t>
+            </a:r>
           </a:p>
         </p:txBody>
       </p:sp>

</xml_diff>

<commit_message>
Added slide for progress report
</commit_message>
<xml_diff>
--- a/Project Documents/Progress Report 2/Progress report.pptx
+++ b/Project Documents/Progress Report 2/Progress report.pptx
@@ -28,16 +28,20 @@
     <p:sldId id="289" r:id="rId22"/>
     <p:sldId id="272" r:id="rId23"/>
     <p:sldId id="274" r:id="rId24"/>
-    <p:sldId id="297" r:id="rId25"/>
-    <p:sldId id="277" r:id="rId26"/>
-    <p:sldId id="278" r:id="rId27"/>
-    <p:sldId id="279" r:id="rId28"/>
-    <p:sldId id="280" r:id="rId29"/>
-    <p:sldId id="281" r:id="rId30"/>
-    <p:sldId id="282" r:id="rId31"/>
-    <p:sldId id="293" r:id="rId32"/>
-    <p:sldId id="276" r:id="rId33"/>
-    <p:sldId id="295" r:id="rId34"/>
+    <p:sldId id="299" r:id="rId25"/>
+    <p:sldId id="300" r:id="rId26"/>
+    <p:sldId id="301" r:id="rId27"/>
+    <p:sldId id="302" r:id="rId28"/>
+    <p:sldId id="297" r:id="rId29"/>
+    <p:sldId id="277" r:id="rId30"/>
+    <p:sldId id="278" r:id="rId31"/>
+    <p:sldId id="279" r:id="rId32"/>
+    <p:sldId id="280" r:id="rId33"/>
+    <p:sldId id="281" r:id="rId34"/>
+    <p:sldId id="282" r:id="rId35"/>
+    <p:sldId id="293" r:id="rId36"/>
+    <p:sldId id="276" r:id="rId37"/>
+    <p:sldId id="295" r:id="rId38"/>
   </p:sldIdLst>
   <p:sldSz cx="12192000" cy="6858000"/>
   <p:notesSz cx="6858000" cy="9144000"/>
@@ -5670,7 +5674,7 @@
           <a:p>
             <a:r>
               <a:rPr lang="en-US" dirty="0"/>
-              <a:t>Week by week summary</a:t>
+              <a:t>Heroku</a:t>
             </a:r>
           </a:p>
         </p:txBody>
@@ -5690,14 +5694,45 @@
           <a:bodyPr/>
           <a:lstStyle/>
           <a:p>
-            <a:endParaRPr lang="en-US"/>
+            <a:r>
+              <a:rPr lang="en-US" dirty="0"/>
+              <a:t>Moved project to Heroku</a:t>
+            </a:r>
+          </a:p>
+          <a:p>
+            <a:pPr lvl="1"/>
+            <a:r>
+              <a:rPr lang="en-US" dirty="0"/>
+              <a:t>Takes care of the most back end things</a:t>
+            </a:r>
+          </a:p>
+          <a:p>
+            <a:pPr lvl="1"/>
+            <a:r>
+              <a:rPr lang="en-US" dirty="0"/>
+              <a:t>Easy to setup</a:t>
+            </a:r>
+          </a:p>
+          <a:p>
+            <a:pPr lvl="1"/>
+            <a:r>
+              <a:rPr lang="en-US" dirty="0"/>
+              <a:t>Vrok.it also utilized</a:t>
+            </a:r>
+          </a:p>
+          <a:p>
+            <a:pPr lvl="1"/>
+            <a:r>
+              <a:rPr lang="en-US" dirty="0"/>
+              <a:t>Free!</a:t>
+            </a:r>
           </a:p>
         </p:txBody>
       </p:sp>
     </p:spTree>
     <p:extLst>
       <p:ext uri="{BB962C8B-B14F-4D97-AF65-F5344CB8AC3E}">
-        <p14:creationId xmlns:p14="http://schemas.microsoft.com/office/powerpoint/2010/main" val="4114061100"/>
+        <p14:creationId xmlns:p14="http://schemas.microsoft.com/office/powerpoint/2010/main" val="3373248086"/>
       </p:ext>
     </p:extLst>
   </p:cSld>
@@ -5741,7 +5776,7 @@
           <a:p>
             <a:r>
               <a:rPr lang="en-US" dirty="0"/>
-              <a:t>Winter Week 1</a:t>
+              <a:t>Node.js</a:t>
             </a:r>
           </a:p>
         </p:txBody>
@@ -5761,14 +5796,29 @@
           <a:bodyPr/>
           <a:lstStyle/>
           <a:p>
-            <a:endParaRPr lang="en-US" dirty="0"/>
+            <a:r>
+              <a:rPr lang="en-US" dirty="0"/>
+              <a:t>Asynchronous</a:t>
+            </a:r>
+          </a:p>
+          <a:p>
+            <a:r>
+              <a:rPr lang="en-US" dirty="0"/>
+              <a:t>Server side</a:t>
+            </a:r>
+          </a:p>
+          <a:p>
+            <a:r>
+              <a:rPr lang="en-US" dirty="0"/>
+              <a:t>Used by vrok.it and API</a:t>
+            </a:r>
           </a:p>
         </p:txBody>
       </p:sp>
     </p:spTree>
     <p:extLst>
       <p:ext uri="{BB962C8B-B14F-4D97-AF65-F5344CB8AC3E}">
-        <p14:creationId xmlns:p14="http://schemas.microsoft.com/office/powerpoint/2010/main" val="3357475344"/>
+        <p14:creationId xmlns:p14="http://schemas.microsoft.com/office/powerpoint/2010/main" val="898502521"/>
       </p:ext>
     </p:extLst>
   </p:cSld>
@@ -5812,7 +5862,7 @@
           <a:p>
             <a:r>
               <a:rPr lang="en-US" dirty="0"/>
-              <a:t>Winter Week 2</a:t>
+              <a:t>Express.js	</a:t>
             </a:r>
           </a:p>
         </p:txBody>
@@ -5832,17 +5882,62 @@
           <a:bodyPr/>
           <a:lstStyle/>
           <a:p>
-            <a:pPr marL="457200" lvl="1" indent="0">
-              <a:buNone/>
-            </a:pPr>
+            <a:r>
+              <a:rPr lang="en-US" dirty="0"/>
+              <a:t>Utilized by Vrok.it and API already</a:t>
+            </a:r>
+          </a:p>
+          <a:p>
+            <a:r>
+              <a:rPr lang="en-US" dirty="0"/>
+              <a:t>Node.js web app framework</a:t>
+            </a:r>
+          </a:p>
+          <a:p>
+            <a:r>
+              <a:rPr lang="en-US" dirty="0"/>
+              <a:t>Matches on request sent to server</a:t>
+            </a:r>
+          </a:p>
+          <a:p>
             <a:endParaRPr lang="en-US" dirty="0"/>
           </a:p>
         </p:txBody>
       </p:sp>
+      <p:pic>
+        <p:nvPicPr>
+          <p:cNvPr id="4" name="Picture 3"/>
+          <p:cNvPicPr>
+            <a:picLocks noChangeAspect="1"/>
+          </p:cNvPicPr>
+          <p:nvPr/>
+        </p:nvPicPr>
+        <p:blipFill>
+          <a:blip r:embed="rId2">
+            <a:extLst>
+              <a:ext uri="{28A0092B-C50C-407E-A947-70E740481C1C}">
+                <a14:useLocalDpi xmlns:a14="http://schemas.microsoft.com/office/drawing/2010/main" val="0"/>
+              </a:ext>
+            </a:extLst>
+          </a:blip>
+          <a:stretch>
+            <a:fillRect/>
+          </a:stretch>
+        </p:blipFill>
+        <p:spPr>
+          <a:xfrm>
+            <a:off x="5268408" y="2496773"/>
+            <a:ext cx="5887272" cy="3372321"/>
+          </a:xfrm>
+          <a:prstGeom prst="rect">
+            <a:avLst/>
+          </a:prstGeom>
+        </p:spPr>
+      </p:pic>
     </p:spTree>
     <p:extLst>
       <p:ext uri="{BB962C8B-B14F-4D97-AF65-F5344CB8AC3E}">
-        <p14:creationId xmlns:p14="http://schemas.microsoft.com/office/powerpoint/2010/main" val="3816315661"/>
+        <p14:creationId xmlns:p14="http://schemas.microsoft.com/office/powerpoint/2010/main" val="3351494084"/>
       </p:ext>
     </p:extLst>
   </p:cSld>
@@ -5886,7 +5981,7 @@
           <a:p>
             <a:r>
               <a:rPr lang="en-US" dirty="0"/>
-              <a:t>Winter Week 3</a:t>
+              <a:t>3-Legged Authentication</a:t>
             </a:r>
           </a:p>
         </p:txBody>
@@ -5906,14 +6001,164 @@
           <a:bodyPr/>
           <a:lstStyle/>
           <a:p>
+            <a:r>
+              <a:rPr lang="en-US" dirty="0" err="1"/>
+              <a:t>Url</a:t>
+            </a:r>
+            <a:r>
+              <a:rPr lang="en-US" dirty="0"/>
+              <a:t> </a:t>
+            </a:r>
+            <a:r>
+              <a:rPr lang="en-US" dirty="0" err="1"/>
+              <a:t>matchs</a:t>
+            </a:r>
+            <a:r>
+              <a:rPr lang="en-US" dirty="0"/>
+              <a:t> and calls function to give </a:t>
+            </a:r>
+            <a:r>
+              <a:rPr lang="en-US" dirty="0" err="1"/>
+              <a:t>url</a:t>
+            </a:r>
+            <a:r>
+              <a:rPr lang="en-US" dirty="0"/>
+              <a:t> that redirects to Autodesk</a:t>
+            </a:r>
+          </a:p>
+          <a:p>
+            <a:r>
+              <a:rPr lang="en-US" dirty="0"/>
+              <a:t>Receive URL and redirect to Autodesk to receive token.</a:t>
+            </a:r>
+          </a:p>
+          <a:p>
+            <a:r>
+              <a:rPr lang="en-US" dirty="0"/>
+              <a:t>Not Working as </a:t>
+            </a:r>
+            <a:r>
+              <a:rPr lang="en-US"/>
+              <a:t>it should…</a:t>
+            </a:r>
             <a:endParaRPr lang="en-US" dirty="0"/>
+          </a:p>
+        </p:txBody>
+      </p:sp>
+      <p:pic>
+        <p:nvPicPr>
+          <p:cNvPr id="9" name="Content Placeholder 3"/>
+          <p:cNvPicPr>
+            <a:picLocks noChangeAspect="1"/>
+          </p:cNvPicPr>
+          <p:nvPr/>
+        </p:nvPicPr>
+        <p:blipFill>
+          <a:blip r:embed="rId2">
+            <a:extLst>
+              <a:ext uri="{28A0092B-C50C-407E-A947-70E740481C1C}">
+                <a14:useLocalDpi xmlns:a14="http://schemas.microsoft.com/office/drawing/2010/main" val="0"/>
+              </a:ext>
+            </a:extLst>
+          </a:blip>
+          <a:stretch>
+            <a:fillRect/>
+          </a:stretch>
+        </p:blipFill>
+        <p:spPr>
+          <a:xfrm>
+            <a:off x="1097280" y="3891107"/>
+            <a:ext cx="10058400" cy="1865929"/>
+          </a:xfrm>
+          <a:prstGeom prst="rect">
+            <a:avLst/>
+          </a:prstGeom>
+        </p:spPr>
+      </p:pic>
+      <p:sp>
+        <p:nvSpPr>
+          <p:cNvPr id="10" name="Arrow: Right 9"/>
+          <p:cNvSpPr/>
+          <p:nvPr/>
+        </p:nvSpPr>
+        <p:spPr>
+          <a:xfrm>
+            <a:off x="5016616" y="4387844"/>
+            <a:ext cx="1744911" cy="436227"/>
+          </a:xfrm>
+          <a:prstGeom prst="rightArrow">
+            <a:avLst/>
+          </a:prstGeom>
+        </p:spPr>
+        <p:style>
+          <a:lnRef idx="2">
+            <a:schemeClr val="accent1">
+              <a:shade val="50000"/>
+            </a:schemeClr>
+          </a:lnRef>
+          <a:fillRef idx="1">
+            <a:schemeClr val="accent1"/>
+          </a:fillRef>
+          <a:effectRef idx="0">
+            <a:schemeClr val="accent1"/>
+          </a:effectRef>
+          <a:fontRef idx="minor">
+            <a:schemeClr val="lt1"/>
+          </a:fontRef>
+        </p:style>
+        <p:txBody>
+          <a:bodyPr rtlCol="0" anchor="ctr"/>
+          <a:lstStyle/>
+          <a:p>
+            <a:pPr algn="ctr"/>
+            <a:endParaRPr lang="en-US"/>
+          </a:p>
+        </p:txBody>
+      </p:sp>
+      <p:sp>
+        <p:nvSpPr>
+          <p:cNvPr id="11" name="Arrow: Right 10"/>
+          <p:cNvSpPr/>
+          <p:nvPr/>
+        </p:nvSpPr>
+        <p:spPr>
+          <a:xfrm rot="10800000">
+            <a:off x="5016616" y="4976471"/>
+            <a:ext cx="1744911" cy="436227"/>
+          </a:xfrm>
+          <a:prstGeom prst="rightArrow">
+            <a:avLst/>
+          </a:prstGeom>
+        </p:spPr>
+        <p:style>
+          <a:lnRef idx="2">
+            <a:schemeClr val="accent1">
+              <a:shade val="50000"/>
+            </a:schemeClr>
+          </a:lnRef>
+          <a:fillRef idx="1">
+            <a:schemeClr val="accent1"/>
+          </a:fillRef>
+          <a:effectRef idx="0">
+            <a:schemeClr val="accent1"/>
+          </a:effectRef>
+          <a:fontRef idx="minor">
+            <a:schemeClr val="lt1"/>
+          </a:fontRef>
+        </p:style>
+        <p:txBody>
+          <a:bodyPr rtlCol="0" anchor="ctr"/>
+          <a:lstStyle/>
+          <a:p>
+            <a:pPr algn="ctr"/>
+            <a:endParaRPr lang="en-US"/>
           </a:p>
         </p:txBody>
       </p:sp>
     </p:spTree>
     <p:extLst>
       <p:ext uri="{BB962C8B-B14F-4D97-AF65-F5344CB8AC3E}">
-        <p14:creationId xmlns:p14="http://schemas.microsoft.com/office/powerpoint/2010/main" val="1610455051"/>
+        <p14:creationId xmlns:p14="http://schemas.microsoft.com/office/powerpoint/2010/main" val="1200501418"/>
       </p:ext>
     </p:extLst>
   </p:cSld>
@@ -5957,7 +6202,7 @@
           <a:p>
             <a:r>
               <a:rPr lang="en-US" dirty="0"/>
-              <a:t>Winter Week 4</a:t>
+              <a:t>Week by week summary</a:t>
             </a:r>
           </a:p>
         </p:txBody>
@@ -5977,14 +6222,14 @@
           <a:bodyPr/>
           <a:lstStyle/>
           <a:p>
-            <a:endParaRPr lang="en-US" dirty="0"/>
+            <a:endParaRPr lang="en-US"/>
           </a:p>
         </p:txBody>
       </p:sp>
     </p:spTree>
     <p:extLst>
       <p:ext uri="{BB962C8B-B14F-4D97-AF65-F5344CB8AC3E}">
-        <p14:creationId xmlns:p14="http://schemas.microsoft.com/office/powerpoint/2010/main" val="270471938"/>
+        <p14:creationId xmlns:p14="http://schemas.microsoft.com/office/powerpoint/2010/main" val="4114061100"/>
       </p:ext>
     </p:extLst>
   </p:cSld>
@@ -6028,7 +6273,7 @@
           <a:p>
             <a:r>
               <a:rPr lang="en-US" dirty="0"/>
-              <a:t>Winter Week 5</a:t>
+              <a:t>Winter Week 1</a:t>
             </a:r>
           </a:p>
         </p:txBody>
@@ -6055,7 +6300,7 @@
     </p:spTree>
     <p:extLst>
       <p:ext uri="{BB962C8B-B14F-4D97-AF65-F5344CB8AC3E}">
-        <p14:creationId xmlns:p14="http://schemas.microsoft.com/office/powerpoint/2010/main" val="4206706309"/>
+        <p14:creationId xmlns:p14="http://schemas.microsoft.com/office/powerpoint/2010/main" val="3357475344"/>
       </p:ext>
     </p:extLst>
   </p:cSld>
@@ -6158,6 +6403,293 @@
           <a:p>
             <a:r>
               <a:rPr lang="en-US" dirty="0"/>
+              <a:t>Winter Week 2</a:t>
+            </a:r>
+          </a:p>
+        </p:txBody>
+      </p:sp>
+      <p:sp>
+        <p:nvSpPr>
+          <p:cNvPr id="3" name="Content Placeholder 2"/>
+          <p:cNvSpPr>
+            <a:spLocks noGrp="1"/>
+          </p:cNvSpPr>
+          <p:nvPr>
+            <p:ph idx="1"/>
+          </p:nvPr>
+        </p:nvSpPr>
+        <p:spPr/>
+        <p:txBody>
+          <a:bodyPr/>
+          <a:lstStyle/>
+          <a:p>
+            <a:pPr marL="457200" lvl="1" indent="0">
+              <a:buNone/>
+            </a:pPr>
+            <a:endParaRPr lang="en-US" dirty="0"/>
+          </a:p>
+        </p:txBody>
+      </p:sp>
+    </p:spTree>
+    <p:extLst>
+      <p:ext uri="{BB962C8B-B14F-4D97-AF65-F5344CB8AC3E}">
+        <p14:creationId xmlns:p14="http://schemas.microsoft.com/office/powerpoint/2010/main" val="3816315661"/>
+      </p:ext>
+    </p:extLst>
+  </p:cSld>
+  <p:clrMapOvr>
+    <a:masterClrMapping/>
+  </p:clrMapOvr>
+</p:sld>
+</file>
+
+<file path=ppt/slides/slide31.xml><?xml version="1.0" encoding="utf-8"?>
+<p:sld xmlns:a="http://schemas.openxmlformats.org/drawingml/2006/main" xmlns:r="http://schemas.openxmlformats.org/officeDocument/2006/relationships" xmlns:p="http://schemas.openxmlformats.org/presentationml/2006/main">
+  <p:cSld>
+    <p:spTree>
+      <p:nvGrpSpPr>
+        <p:cNvPr id="1" name=""/>
+        <p:cNvGrpSpPr/>
+        <p:nvPr/>
+      </p:nvGrpSpPr>
+      <p:grpSpPr>
+        <a:xfrm>
+          <a:off x="0" y="0"/>
+          <a:ext cx="0" cy="0"/>
+          <a:chOff x="0" y="0"/>
+          <a:chExt cx="0" cy="0"/>
+        </a:xfrm>
+      </p:grpSpPr>
+      <p:sp>
+        <p:nvSpPr>
+          <p:cNvPr id="2" name="Title 1"/>
+          <p:cNvSpPr>
+            <a:spLocks noGrp="1"/>
+          </p:cNvSpPr>
+          <p:nvPr>
+            <p:ph type="title"/>
+          </p:nvPr>
+        </p:nvSpPr>
+        <p:spPr/>
+        <p:txBody>
+          <a:bodyPr/>
+          <a:lstStyle/>
+          <a:p>
+            <a:r>
+              <a:rPr lang="en-US" dirty="0"/>
+              <a:t>Winter Week 3</a:t>
+            </a:r>
+          </a:p>
+        </p:txBody>
+      </p:sp>
+      <p:sp>
+        <p:nvSpPr>
+          <p:cNvPr id="3" name="Content Placeholder 2"/>
+          <p:cNvSpPr>
+            <a:spLocks noGrp="1"/>
+          </p:cNvSpPr>
+          <p:nvPr>
+            <p:ph idx="1"/>
+          </p:nvPr>
+        </p:nvSpPr>
+        <p:spPr/>
+        <p:txBody>
+          <a:bodyPr/>
+          <a:lstStyle/>
+          <a:p>
+            <a:endParaRPr lang="en-US" dirty="0"/>
+          </a:p>
+        </p:txBody>
+      </p:sp>
+    </p:spTree>
+    <p:extLst>
+      <p:ext uri="{BB962C8B-B14F-4D97-AF65-F5344CB8AC3E}">
+        <p14:creationId xmlns:p14="http://schemas.microsoft.com/office/powerpoint/2010/main" val="1610455051"/>
+      </p:ext>
+    </p:extLst>
+  </p:cSld>
+  <p:clrMapOvr>
+    <a:masterClrMapping/>
+  </p:clrMapOvr>
+</p:sld>
+</file>
+
+<file path=ppt/slides/slide32.xml><?xml version="1.0" encoding="utf-8"?>
+<p:sld xmlns:a="http://schemas.openxmlformats.org/drawingml/2006/main" xmlns:r="http://schemas.openxmlformats.org/officeDocument/2006/relationships" xmlns:p="http://schemas.openxmlformats.org/presentationml/2006/main">
+  <p:cSld>
+    <p:spTree>
+      <p:nvGrpSpPr>
+        <p:cNvPr id="1" name=""/>
+        <p:cNvGrpSpPr/>
+        <p:nvPr/>
+      </p:nvGrpSpPr>
+      <p:grpSpPr>
+        <a:xfrm>
+          <a:off x="0" y="0"/>
+          <a:ext cx="0" cy="0"/>
+          <a:chOff x="0" y="0"/>
+          <a:chExt cx="0" cy="0"/>
+        </a:xfrm>
+      </p:grpSpPr>
+      <p:sp>
+        <p:nvSpPr>
+          <p:cNvPr id="2" name="Title 1"/>
+          <p:cNvSpPr>
+            <a:spLocks noGrp="1"/>
+          </p:cNvSpPr>
+          <p:nvPr>
+            <p:ph type="title"/>
+          </p:nvPr>
+        </p:nvSpPr>
+        <p:spPr/>
+        <p:txBody>
+          <a:bodyPr/>
+          <a:lstStyle/>
+          <a:p>
+            <a:r>
+              <a:rPr lang="en-US" dirty="0"/>
+              <a:t>Winter Week 4</a:t>
+            </a:r>
+          </a:p>
+        </p:txBody>
+      </p:sp>
+      <p:sp>
+        <p:nvSpPr>
+          <p:cNvPr id="3" name="Content Placeholder 2"/>
+          <p:cNvSpPr>
+            <a:spLocks noGrp="1"/>
+          </p:cNvSpPr>
+          <p:nvPr>
+            <p:ph idx="1"/>
+          </p:nvPr>
+        </p:nvSpPr>
+        <p:spPr/>
+        <p:txBody>
+          <a:bodyPr/>
+          <a:lstStyle/>
+          <a:p>
+            <a:endParaRPr lang="en-US" dirty="0"/>
+          </a:p>
+        </p:txBody>
+      </p:sp>
+    </p:spTree>
+    <p:extLst>
+      <p:ext uri="{BB962C8B-B14F-4D97-AF65-F5344CB8AC3E}">
+        <p14:creationId xmlns:p14="http://schemas.microsoft.com/office/powerpoint/2010/main" val="270471938"/>
+      </p:ext>
+    </p:extLst>
+  </p:cSld>
+  <p:clrMapOvr>
+    <a:masterClrMapping/>
+  </p:clrMapOvr>
+</p:sld>
+</file>
+
+<file path=ppt/slides/slide33.xml><?xml version="1.0" encoding="utf-8"?>
+<p:sld xmlns:a="http://schemas.openxmlformats.org/drawingml/2006/main" xmlns:r="http://schemas.openxmlformats.org/officeDocument/2006/relationships" xmlns:p="http://schemas.openxmlformats.org/presentationml/2006/main">
+  <p:cSld>
+    <p:spTree>
+      <p:nvGrpSpPr>
+        <p:cNvPr id="1" name=""/>
+        <p:cNvGrpSpPr/>
+        <p:nvPr/>
+      </p:nvGrpSpPr>
+      <p:grpSpPr>
+        <a:xfrm>
+          <a:off x="0" y="0"/>
+          <a:ext cx="0" cy="0"/>
+          <a:chOff x="0" y="0"/>
+          <a:chExt cx="0" cy="0"/>
+        </a:xfrm>
+      </p:grpSpPr>
+      <p:sp>
+        <p:nvSpPr>
+          <p:cNvPr id="2" name="Title 1"/>
+          <p:cNvSpPr>
+            <a:spLocks noGrp="1"/>
+          </p:cNvSpPr>
+          <p:nvPr>
+            <p:ph type="title"/>
+          </p:nvPr>
+        </p:nvSpPr>
+        <p:spPr/>
+        <p:txBody>
+          <a:bodyPr/>
+          <a:lstStyle/>
+          <a:p>
+            <a:r>
+              <a:rPr lang="en-US" dirty="0"/>
+              <a:t>Winter Week 5</a:t>
+            </a:r>
+          </a:p>
+        </p:txBody>
+      </p:sp>
+      <p:sp>
+        <p:nvSpPr>
+          <p:cNvPr id="3" name="Content Placeholder 2"/>
+          <p:cNvSpPr>
+            <a:spLocks noGrp="1"/>
+          </p:cNvSpPr>
+          <p:nvPr>
+            <p:ph idx="1"/>
+          </p:nvPr>
+        </p:nvSpPr>
+        <p:spPr/>
+        <p:txBody>
+          <a:bodyPr/>
+          <a:lstStyle/>
+          <a:p>
+            <a:endParaRPr lang="en-US" dirty="0"/>
+          </a:p>
+        </p:txBody>
+      </p:sp>
+    </p:spTree>
+    <p:extLst>
+      <p:ext uri="{BB962C8B-B14F-4D97-AF65-F5344CB8AC3E}">
+        <p14:creationId xmlns:p14="http://schemas.microsoft.com/office/powerpoint/2010/main" val="4206706309"/>
+      </p:ext>
+    </p:extLst>
+  </p:cSld>
+  <p:clrMapOvr>
+    <a:masterClrMapping/>
+  </p:clrMapOvr>
+</p:sld>
+</file>
+
+<file path=ppt/slides/slide34.xml><?xml version="1.0" encoding="utf-8"?>
+<p:sld xmlns:a="http://schemas.openxmlformats.org/drawingml/2006/main" xmlns:r="http://schemas.openxmlformats.org/officeDocument/2006/relationships" xmlns:p="http://schemas.openxmlformats.org/presentationml/2006/main">
+  <p:cSld>
+    <p:spTree>
+      <p:nvGrpSpPr>
+        <p:cNvPr id="1" name=""/>
+        <p:cNvGrpSpPr/>
+        <p:nvPr/>
+      </p:nvGrpSpPr>
+      <p:grpSpPr>
+        <a:xfrm>
+          <a:off x="0" y="0"/>
+          <a:ext cx="0" cy="0"/>
+          <a:chOff x="0" y="0"/>
+          <a:chExt cx="0" cy="0"/>
+        </a:xfrm>
+      </p:grpSpPr>
+      <p:sp>
+        <p:nvSpPr>
+          <p:cNvPr id="2" name="Title 1"/>
+          <p:cNvSpPr>
+            <a:spLocks noGrp="1"/>
+          </p:cNvSpPr>
+          <p:nvPr>
+            <p:ph type="title"/>
+          </p:nvPr>
+        </p:nvSpPr>
+        <p:spPr/>
+        <p:txBody>
+          <a:bodyPr/>
+          <a:lstStyle/>
+          <a:p>
+            <a:r>
+              <a:rPr lang="en-US" dirty="0"/>
               <a:t>Winter Week 6</a:t>
             </a:r>
           </a:p>
@@ -6246,7 +6778,7 @@
 </p:sld>
 </file>
 
-<file path=ppt/slides/slide31.xml><?xml version="1.0" encoding="utf-8"?>
+<file path=ppt/slides/slide35.xml><?xml version="1.0" encoding="utf-8"?>
 <p:sld xmlns:a="http://schemas.openxmlformats.org/drawingml/2006/main" xmlns:r="http://schemas.openxmlformats.org/officeDocument/2006/relationships" xmlns:p="http://schemas.openxmlformats.org/presentationml/2006/main">
   <p:cSld>
     <p:spTree>
@@ -6690,7 +7222,7 @@
 </p:sld>
 </file>
 
-<file path=ppt/slides/slide32.xml><?xml version="1.0" encoding="utf-8"?>
+<file path=ppt/slides/slide36.xml><?xml version="1.0" encoding="utf-8"?>
 <p:sld xmlns:a="http://schemas.openxmlformats.org/drawingml/2006/main" xmlns:r="http://schemas.openxmlformats.org/officeDocument/2006/relationships" xmlns:p="http://schemas.openxmlformats.org/presentationml/2006/main">
   <p:cSld>
     <p:spTree>
@@ -6813,7 +7345,7 @@
 </p:sld>
 </file>
 
-<file path=ppt/slides/slide33.xml><?xml version="1.0" encoding="utf-8"?>
+<file path=ppt/slides/slide37.xml><?xml version="1.0" encoding="utf-8"?>
 <p:sld xmlns:a="http://schemas.openxmlformats.org/drawingml/2006/main" xmlns:r="http://schemas.openxmlformats.org/officeDocument/2006/relationships" xmlns:p="http://schemas.openxmlformats.org/presentationml/2006/main">
   <p:cSld>
     <p:spTree>

</xml_diff>

<commit_message>
added file restriction code to index2.html and worked on the power point.
</commit_message>
<xml_diff>
--- a/Project Documents/Progress Report 2/Progress report.pptx
+++ b/Project Documents/Progress Report 2/Progress report.pptx
@@ -29,19 +29,23 @@
     <p:sldId id="272" r:id="rId23"/>
     <p:sldId id="274" r:id="rId24"/>
     <p:sldId id="299" r:id="rId25"/>
-    <p:sldId id="300" r:id="rId26"/>
-    <p:sldId id="301" r:id="rId27"/>
-    <p:sldId id="302" r:id="rId28"/>
-    <p:sldId id="297" r:id="rId29"/>
-    <p:sldId id="277" r:id="rId30"/>
-    <p:sldId id="278" r:id="rId31"/>
-    <p:sldId id="279" r:id="rId32"/>
-    <p:sldId id="280" r:id="rId33"/>
-    <p:sldId id="281" r:id="rId34"/>
-    <p:sldId id="282" r:id="rId35"/>
-    <p:sldId id="293" r:id="rId36"/>
-    <p:sldId id="276" r:id="rId37"/>
-    <p:sldId id="295" r:id="rId38"/>
+    <p:sldId id="305" r:id="rId26"/>
+    <p:sldId id="304" r:id="rId27"/>
+    <p:sldId id="303" r:id="rId28"/>
+    <p:sldId id="300" r:id="rId29"/>
+    <p:sldId id="301" r:id="rId30"/>
+    <p:sldId id="302" r:id="rId31"/>
+    <p:sldId id="306" r:id="rId32"/>
+    <p:sldId id="297" r:id="rId33"/>
+    <p:sldId id="277" r:id="rId34"/>
+    <p:sldId id="278" r:id="rId35"/>
+    <p:sldId id="279" r:id="rId36"/>
+    <p:sldId id="280" r:id="rId37"/>
+    <p:sldId id="281" r:id="rId38"/>
+    <p:sldId id="282" r:id="rId39"/>
+    <p:sldId id="293" r:id="rId40"/>
+    <p:sldId id="276" r:id="rId41"/>
+    <p:sldId id="295" r:id="rId42"/>
   </p:sldIdLst>
   <p:sldSz cx="12192000" cy="6858000"/>
   <p:notesSz cx="6858000" cy="9144000"/>
@@ -374,7 +378,7 @@
           <a:p>
             <a:fld id="{B17AFAAB-B546-45EA-83F1-D6961F00B077}" type="datetimeFigureOut">
               <a:rPr lang="en-US" smtClean="0"/>
-              <a:t>2/14/2017</a:t>
+              <a:t>2/15/2017</a:t>
             </a:fld>
             <a:endParaRPr lang="en-US"/>
           </a:p>
@@ -582,7 +586,7 @@
           <a:p>
             <a:fld id="{B17AFAAB-B546-45EA-83F1-D6961F00B077}" type="datetimeFigureOut">
               <a:rPr lang="en-US" smtClean="0"/>
-              <a:t>2/14/2017</a:t>
+              <a:t>2/15/2017</a:t>
             </a:fld>
             <a:endParaRPr lang="en-US"/>
           </a:p>
@@ -838,7 +842,7 @@
           <a:p>
             <a:fld id="{B17AFAAB-B546-45EA-83F1-D6961F00B077}" type="datetimeFigureOut">
               <a:rPr lang="en-US" smtClean="0"/>
-              <a:t>2/14/2017</a:t>
+              <a:t>2/15/2017</a:t>
             </a:fld>
             <a:endParaRPr lang="en-US"/>
           </a:p>
@@ -1012,7 +1016,7 @@
           <a:p>
             <a:fld id="{B17AFAAB-B546-45EA-83F1-D6961F00B077}" type="datetimeFigureOut">
               <a:rPr lang="en-US" smtClean="0"/>
-              <a:t>2/14/2017</a:t>
+              <a:t>2/15/2017</a:t>
             </a:fld>
             <a:endParaRPr lang="en-US"/>
           </a:p>
@@ -1355,7 +1359,7 @@
           <a:p>
             <a:fld id="{B17AFAAB-B546-45EA-83F1-D6961F00B077}" type="datetimeFigureOut">
               <a:rPr lang="en-US" smtClean="0"/>
-              <a:t>2/14/2017</a:t>
+              <a:t>2/15/2017</a:t>
             </a:fld>
             <a:endParaRPr lang="en-US"/>
           </a:p>
@@ -1630,7 +1634,7 @@
           <a:p>
             <a:fld id="{B17AFAAB-B546-45EA-83F1-D6961F00B077}" type="datetimeFigureOut">
               <a:rPr lang="en-US" smtClean="0"/>
-              <a:t>2/14/2017</a:t>
+              <a:t>2/15/2017</a:t>
             </a:fld>
             <a:endParaRPr lang="en-US"/>
           </a:p>
@@ -2009,7 +2013,7 @@
           <a:p>
             <a:fld id="{B17AFAAB-B546-45EA-83F1-D6961F00B077}" type="datetimeFigureOut">
               <a:rPr lang="en-US" smtClean="0"/>
-              <a:t>2/14/2017</a:t>
+              <a:t>2/15/2017</a:t>
             </a:fld>
             <a:endParaRPr lang="en-US"/>
           </a:p>
@@ -2127,7 +2131,7 @@
           <a:p>
             <a:fld id="{B17AFAAB-B546-45EA-83F1-D6961F00B077}" type="datetimeFigureOut">
               <a:rPr lang="en-US" smtClean="0"/>
-              <a:t>2/14/2017</a:t>
+              <a:t>2/15/2017</a:t>
             </a:fld>
             <a:endParaRPr lang="en-US"/>
           </a:p>
@@ -2298,7 +2302,7 @@
           <a:p>
             <a:fld id="{B17AFAAB-B546-45EA-83F1-D6961F00B077}" type="datetimeFigureOut">
               <a:rPr lang="en-US" smtClean="0"/>
-              <a:t>2/14/2017</a:t>
+              <a:t>2/15/2017</a:t>
             </a:fld>
             <a:endParaRPr lang="en-US"/>
           </a:p>
@@ -2652,7 +2656,7 @@
           <a:p>
             <a:fld id="{B17AFAAB-B546-45EA-83F1-D6961F00B077}" type="datetimeFigureOut">
               <a:rPr lang="en-US" smtClean="0"/>
-              <a:t>2/14/2017</a:t>
+              <a:t>2/15/2017</a:t>
             </a:fld>
             <a:endParaRPr lang="en-US"/>
           </a:p>
@@ -3034,7 +3038,7 @@
           <a:p>
             <a:fld id="{B17AFAAB-B546-45EA-83F1-D6961F00B077}" type="datetimeFigureOut">
               <a:rPr lang="en-US" smtClean="0"/>
-              <a:t>2/14/2017</a:t>
+              <a:t>2/15/2017</a:t>
             </a:fld>
             <a:endParaRPr lang="en-US"/>
           </a:p>
@@ -3321,7 +3325,7 @@
           <a:p>
             <a:fld id="{B17AFAAB-B546-45EA-83F1-D6961F00B077}" type="datetimeFigureOut">
               <a:rPr lang="en-US" smtClean="0"/>
-              <a:t>2/14/2017</a:t>
+              <a:t>2/15/2017</a:t>
             </a:fld>
             <a:endParaRPr lang="en-US"/>
           </a:p>
@@ -5776,6 +5780,358 @@
           <a:p>
             <a:r>
               <a:rPr lang="en-US" dirty="0"/>
+              <a:t>Getting The Website Set Up</a:t>
+            </a:r>
+          </a:p>
+        </p:txBody>
+      </p:sp>
+      <p:sp>
+        <p:nvSpPr>
+          <p:cNvPr id="3" name="Content Placeholder 2"/>
+          <p:cNvSpPr>
+            <a:spLocks noGrp="1"/>
+          </p:cNvSpPr>
+          <p:nvPr>
+            <p:ph idx="1"/>
+          </p:nvPr>
+        </p:nvSpPr>
+        <p:spPr/>
+        <p:txBody>
+          <a:bodyPr/>
+          <a:lstStyle/>
+          <a:p>
+            <a:r>
+              <a:rPr lang="en-US" dirty="0"/>
+              <a:t>Installed </a:t>
+            </a:r>
+            <a:r>
+              <a:rPr lang="en-US" dirty="0" err="1"/>
+              <a:t>heroku</a:t>
+            </a:r>
+            <a:r>
+              <a:rPr lang="en-US" dirty="0"/>
+              <a:t> and node.js</a:t>
+            </a:r>
+          </a:p>
+          <a:p>
+            <a:r>
+              <a:rPr lang="en-US" dirty="0"/>
+              <a:t>Edited the credentials in the </a:t>
+            </a:r>
+            <a:r>
+              <a:rPr lang="en-US" dirty="0" err="1"/>
+              <a:t>js</a:t>
+            </a:r>
+            <a:r>
+              <a:rPr lang="en-US" dirty="0"/>
+              <a:t> files</a:t>
+            </a:r>
+          </a:p>
+          <a:p>
+            <a:r>
+              <a:rPr lang="en-US" dirty="0"/>
+              <a:t>Created a bucket for files</a:t>
+            </a:r>
+          </a:p>
+          <a:p>
+            <a:r>
+              <a:rPr lang="en-US" dirty="0"/>
+              <a:t>Filled bucket with some Test files</a:t>
+            </a:r>
+          </a:p>
+          <a:p>
+            <a:endParaRPr lang="en-US" dirty="0"/>
+          </a:p>
+        </p:txBody>
+      </p:sp>
+    </p:spTree>
+    <p:extLst>
+      <p:ext uri="{BB962C8B-B14F-4D97-AF65-F5344CB8AC3E}">
+        <p14:creationId xmlns:p14="http://schemas.microsoft.com/office/powerpoint/2010/main" val="2629681458"/>
+      </p:ext>
+    </p:extLst>
+  </p:cSld>
+  <p:clrMapOvr>
+    <a:masterClrMapping/>
+  </p:clrMapOvr>
+</p:sld>
+</file>
+
+<file path=ppt/slides/slide26.xml><?xml version="1.0" encoding="utf-8"?>
+<p:sld xmlns:a="http://schemas.openxmlformats.org/drawingml/2006/main" xmlns:r="http://schemas.openxmlformats.org/officeDocument/2006/relationships" xmlns:p="http://schemas.openxmlformats.org/presentationml/2006/main">
+  <p:cSld>
+    <p:spTree>
+      <p:nvGrpSpPr>
+        <p:cNvPr id="1" name=""/>
+        <p:cNvGrpSpPr/>
+        <p:nvPr/>
+      </p:nvGrpSpPr>
+      <p:grpSpPr>
+        <a:xfrm>
+          <a:off x="0" y="0"/>
+          <a:ext cx="0" cy="0"/>
+          <a:chOff x="0" y="0"/>
+          <a:chExt cx="0" cy="0"/>
+        </a:xfrm>
+      </p:grpSpPr>
+      <p:sp>
+        <p:nvSpPr>
+          <p:cNvPr id="2" name="Title 1"/>
+          <p:cNvSpPr>
+            <a:spLocks noGrp="1"/>
+          </p:cNvSpPr>
+          <p:nvPr>
+            <p:ph type="title"/>
+          </p:nvPr>
+        </p:nvSpPr>
+        <p:spPr/>
+        <p:txBody>
+          <a:bodyPr/>
+          <a:lstStyle/>
+          <a:p>
+            <a:r>
+              <a:rPr lang="en-US" dirty="0"/>
+              <a:t>Local File Upload</a:t>
+            </a:r>
+          </a:p>
+        </p:txBody>
+      </p:sp>
+      <p:sp>
+        <p:nvSpPr>
+          <p:cNvPr id="3" name="Content Placeholder 2"/>
+          <p:cNvSpPr>
+            <a:spLocks noGrp="1"/>
+          </p:cNvSpPr>
+          <p:nvPr>
+            <p:ph idx="1"/>
+          </p:nvPr>
+        </p:nvSpPr>
+        <p:spPr/>
+        <p:txBody>
+          <a:bodyPr/>
+          <a:lstStyle/>
+          <a:p>
+            <a:r>
+              <a:rPr lang="en-US" dirty="0"/>
+              <a:t>Model derivative accepts roughly 60 different types of files.</a:t>
+            </a:r>
+          </a:p>
+          <a:p>
+            <a:r>
+              <a:rPr lang="en-US" dirty="0"/>
+              <a:t>Files Uploaded will be placed in the list of viewable models.</a:t>
+            </a:r>
+          </a:p>
+          <a:p>
+            <a:r>
+              <a:rPr lang="en-US" dirty="0"/>
+              <a:t>Once successfully uploaded the files will be loaded into the viewer.</a:t>
+            </a:r>
+          </a:p>
+          <a:p>
+            <a:pPr marL="0" indent="0">
+              <a:buNone/>
+            </a:pPr>
+            <a:r>
+              <a:rPr lang="en-US" dirty="0"/>
+              <a:t> Files uploaded will be placed in the </a:t>
+            </a:r>
+          </a:p>
+          <a:p>
+            <a:r>
+              <a:rPr lang="en-US" dirty="0"/>
+              <a:t>bucket temporally.</a:t>
+            </a:r>
+          </a:p>
+        </p:txBody>
+      </p:sp>
+      <p:pic>
+        <p:nvPicPr>
+          <p:cNvPr id="4" name="Picture 3"/>
+          <p:cNvPicPr>
+            <a:picLocks noChangeAspect="1"/>
+          </p:cNvPicPr>
+          <p:nvPr/>
+        </p:nvPicPr>
+        <p:blipFill>
+          <a:blip r:embed="rId2">
+            <a:extLst>
+              <a:ext uri="{28A0092B-C50C-407E-A947-70E740481C1C}">
+                <a14:useLocalDpi xmlns:a14="http://schemas.microsoft.com/office/drawing/2010/main" val="0"/>
+              </a:ext>
+            </a:extLst>
+          </a:blip>
+          <a:stretch>
+            <a:fillRect/>
+          </a:stretch>
+        </p:blipFill>
+        <p:spPr>
+          <a:xfrm>
+            <a:off x="5557777" y="3245962"/>
+            <a:ext cx="6634223" cy="2855791"/>
+          </a:xfrm>
+          <a:prstGeom prst="rect">
+            <a:avLst/>
+          </a:prstGeom>
+        </p:spPr>
+      </p:pic>
+    </p:spTree>
+    <p:extLst>
+      <p:ext uri="{BB962C8B-B14F-4D97-AF65-F5344CB8AC3E}">
+        <p14:creationId xmlns:p14="http://schemas.microsoft.com/office/powerpoint/2010/main" val="940399772"/>
+      </p:ext>
+    </p:extLst>
+  </p:cSld>
+  <p:clrMapOvr>
+    <a:masterClrMapping/>
+  </p:clrMapOvr>
+</p:sld>
+</file>
+
+<file path=ppt/slides/slide27.xml><?xml version="1.0" encoding="utf-8"?>
+<p:sld xmlns:a="http://schemas.openxmlformats.org/drawingml/2006/main" xmlns:r="http://schemas.openxmlformats.org/officeDocument/2006/relationships" xmlns:p="http://schemas.openxmlformats.org/presentationml/2006/main">
+  <p:cSld>
+    <p:spTree>
+      <p:nvGrpSpPr>
+        <p:cNvPr id="1" name=""/>
+        <p:cNvGrpSpPr/>
+        <p:nvPr/>
+      </p:nvGrpSpPr>
+      <p:grpSpPr>
+        <a:xfrm>
+          <a:off x="0" y="0"/>
+          <a:ext cx="0" cy="0"/>
+          <a:chOff x="0" y="0"/>
+          <a:chExt cx="0" cy="0"/>
+        </a:xfrm>
+      </p:grpSpPr>
+      <p:sp>
+        <p:nvSpPr>
+          <p:cNvPr id="2" name="Title 1"/>
+          <p:cNvSpPr>
+            <a:spLocks noGrp="1"/>
+          </p:cNvSpPr>
+          <p:nvPr>
+            <p:ph type="title"/>
+          </p:nvPr>
+        </p:nvSpPr>
+        <p:spPr/>
+        <p:txBody>
+          <a:bodyPr/>
+          <a:lstStyle/>
+          <a:p>
+            <a:r>
+              <a:rPr lang="en-US" dirty="0"/>
+              <a:t>Local File Restriction</a:t>
+            </a:r>
+          </a:p>
+        </p:txBody>
+      </p:sp>
+      <p:sp>
+        <p:nvSpPr>
+          <p:cNvPr id="3" name="Content Placeholder 2"/>
+          <p:cNvSpPr>
+            <a:spLocks noGrp="1"/>
+          </p:cNvSpPr>
+          <p:nvPr>
+            <p:ph idx="1"/>
+          </p:nvPr>
+        </p:nvSpPr>
+        <p:spPr/>
+        <p:txBody>
+          <a:bodyPr/>
+          <a:lstStyle/>
+          <a:p>
+            <a:r>
+              <a:rPr lang="en-US" dirty="0"/>
+              <a:t>Used the html accept attribute to restrict the file types</a:t>
+            </a:r>
+          </a:p>
+          <a:p>
+            <a:r>
+              <a:rPr lang="en-US" dirty="0"/>
+              <a:t>Only files of the types listed will show up in the file explorer </a:t>
+            </a:r>
+          </a:p>
+        </p:txBody>
+      </p:sp>
+      <p:pic>
+        <p:nvPicPr>
+          <p:cNvPr id="5" name="Picture 4"/>
+          <p:cNvPicPr>
+            <a:picLocks noChangeAspect="1"/>
+          </p:cNvPicPr>
+          <p:nvPr/>
+        </p:nvPicPr>
+        <p:blipFill>
+          <a:blip r:embed="rId2">
+            <a:extLst>
+              <a:ext uri="{28A0092B-C50C-407E-A947-70E740481C1C}">
+                <a14:useLocalDpi xmlns:a14="http://schemas.microsoft.com/office/drawing/2010/main" val="0"/>
+              </a:ext>
+            </a:extLst>
+          </a:blip>
+          <a:stretch>
+            <a:fillRect/>
+          </a:stretch>
+        </p:blipFill>
+        <p:spPr>
+          <a:xfrm>
+            <a:off x="1097280" y="3130517"/>
+            <a:ext cx="8327641" cy="3195198"/>
+          </a:xfrm>
+          <a:prstGeom prst="rect">
+            <a:avLst/>
+          </a:prstGeom>
+        </p:spPr>
+      </p:pic>
+    </p:spTree>
+    <p:extLst>
+      <p:ext uri="{BB962C8B-B14F-4D97-AF65-F5344CB8AC3E}">
+        <p14:creationId xmlns:p14="http://schemas.microsoft.com/office/powerpoint/2010/main" val="465952325"/>
+      </p:ext>
+    </p:extLst>
+  </p:cSld>
+  <p:clrMapOvr>
+    <a:masterClrMapping/>
+  </p:clrMapOvr>
+</p:sld>
+</file>
+
+<file path=ppt/slides/slide28.xml><?xml version="1.0" encoding="utf-8"?>
+<p:sld xmlns:a="http://schemas.openxmlformats.org/drawingml/2006/main" xmlns:r="http://schemas.openxmlformats.org/officeDocument/2006/relationships" xmlns:p="http://schemas.openxmlformats.org/presentationml/2006/main">
+  <p:cSld>
+    <p:spTree>
+      <p:nvGrpSpPr>
+        <p:cNvPr id="1" name=""/>
+        <p:cNvGrpSpPr/>
+        <p:nvPr/>
+      </p:nvGrpSpPr>
+      <p:grpSpPr>
+        <a:xfrm>
+          <a:off x="0" y="0"/>
+          <a:ext cx="0" cy="0"/>
+          <a:chOff x="0" y="0"/>
+          <a:chExt cx="0" cy="0"/>
+        </a:xfrm>
+      </p:grpSpPr>
+      <p:sp>
+        <p:nvSpPr>
+          <p:cNvPr id="2" name="Title 1"/>
+          <p:cNvSpPr>
+            <a:spLocks noGrp="1"/>
+          </p:cNvSpPr>
+          <p:nvPr>
+            <p:ph type="title"/>
+          </p:nvPr>
+        </p:nvSpPr>
+        <p:spPr/>
+        <p:txBody>
+          <a:bodyPr/>
+          <a:lstStyle/>
+          <a:p>
+            <a:r>
+              <a:rPr lang="en-US" dirty="0"/>
               <a:t>Node.js</a:t>
             </a:r>
           </a:p>
@@ -5828,7 +6184,7 @@
 </p:sld>
 </file>
 
-<file path=ppt/slides/slide26.xml><?xml version="1.0" encoding="utf-8"?>
+<file path=ppt/slides/slide29.xml><?xml version="1.0" encoding="utf-8"?>
 <p:sld xmlns:a="http://schemas.openxmlformats.org/drawingml/2006/main" xmlns:r="http://schemas.openxmlformats.org/officeDocument/2006/relationships" xmlns:p="http://schemas.openxmlformats.org/presentationml/2006/main">
   <p:cSld>
     <p:spTree>
@@ -5938,369 +6294,6 @@
     <p:extLst>
       <p:ext uri="{BB962C8B-B14F-4D97-AF65-F5344CB8AC3E}">
         <p14:creationId xmlns:p14="http://schemas.microsoft.com/office/powerpoint/2010/main" val="3351494084"/>
-      </p:ext>
-    </p:extLst>
-  </p:cSld>
-  <p:clrMapOvr>
-    <a:masterClrMapping/>
-  </p:clrMapOvr>
-</p:sld>
-</file>
-
-<file path=ppt/slides/slide27.xml><?xml version="1.0" encoding="utf-8"?>
-<p:sld xmlns:a="http://schemas.openxmlformats.org/drawingml/2006/main" xmlns:r="http://schemas.openxmlformats.org/officeDocument/2006/relationships" xmlns:p="http://schemas.openxmlformats.org/presentationml/2006/main">
-  <p:cSld>
-    <p:spTree>
-      <p:nvGrpSpPr>
-        <p:cNvPr id="1" name=""/>
-        <p:cNvGrpSpPr/>
-        <p:nvPr/>
-      </p:nvGrpSpPr>
-      <p:grpSpPr>
-        <a:xfrm>
-          <a:off x="0" y="0"/>
-          <a:ext cx="0" cy="0"/>
-          <a:chOff x="0" y="0"/>
-          <a:chExt cx="0" cy="0"/>
-        </a:xfrm>
-      </p:grpSpPr>
-      <p:sp>
-        <p:nvSpPr>
-          <p:cNvPr id="2" name="Title 1"/>
-          <p:cNvSpPr>
-            <a:spLocks noGrp="1"/>
-          </p:cNvSpPr>
-          <p:nvPr>
-            <p:ph type="title"/>
-          </p:nvPr>
-        </p:nvSpPr>
-        <p:spPr/>
-        <p:txBody>
-          <a:bodyPr/>
-          <a:lstStyle/>
-          <a:p>
-            <a:r>
-              <a:rPr lang="en-US" dirty="0"/>
-              <a:t>3-Legged Authentication</a:t>
-            </a:r>
-          </a:p>
-        </p:txBody>
-      </p:sp>
-      <p:sp>
-        <p:nvSpPr>
-          <p:cNvPr id="3" name="Content Placeholder 2"/>
-          <p:cNvSpPr>
-            <a:spLocks noGrp="1"/>
-          </p:cNvSpPr>
-          <p:nvPr>
-            <p:ph idx="1"/>
-          </p:nvPr>
-        </p:nvSpPr>
-        <p:spPr/>
-        <p:txBody>
-          <a:bodyPr/>
-          <a:lstStyle/>
-          <a:p>
-            <a:r>
-              <a:rPr lang="en-US" dirty="0" err="1"/>
-              <a:t>Url</a:t>
-            </a:r>
-            <a:r>
-              <a:rPr lang="en-US" dirty="0"/>
-              <a:t> </a:t>
-            </a:r>
-            <a:r>
-              <a:rPr lang="en-US" dirty="0" err="1"/>
-              <a:t>matchs</a:t>
-            </a:r>
-            <a:r>
-              <a:rPr lang="en-US" dirty="0"/>
-              <a:t> and calls function to give </a:t>
-            </a:r>
-            <a:r>
-              <a:rPr lang="en-US" dirty="0" err="1"/>
-              <a:t>url</a:t>
-            </a:r>
-            <a:r>
-              <a:rPr lang="en-US" dirty="0"/>
-              <a:t> that redirects to Autodesk</a:t>
-            </a:r>
-          </a:p>
-          <a:p>
-            <a:r>
-              <a:rPr lang="en-US" dirty="0"/>
-              <a:t>Receive URL and redirect to Autodesk to receive token.</a:t>
-            </a:r>
-          </a:p>
-          <a:p>
-            <a:r>
-              <a:rPr lang="en-US" dirty="0"/>
-              <a:t>Not Working as </a:t>
-            </a:r>
-            <a:r>
-              <a:rPr lang="en-US"/>
-              <a:t>it should…</a:t>
-            </a:r>
-            <a:endParaRPr lang="en-US" dirty="0"/>
-          </a:p>
-        </p:txBody>
-      </p:sp>
-      <p:pic>
-        <p:nvPicPr>
-          <p:cNvPr id="9" name="Content Placeholder 3"/>
-          <p:cNvPicPr>
-            <a:picLocks noChangeAspect="1"/>
-          </p:cNvPicPr>
-          <p:nvPr/>
-        </p:nvPicPr>
-        <p:blipFill>
-          <a:blip r:embed="rId2">
-            <a:extLst>
-              <a:ext uri="{28A0092B-C50C-407E-A947-70E740481C1C}">
-                <a14:useLocalDpi xmlns:a14="http://schemas.microsoft.com/office/drawing/2010/main" val="0"/>
-              </a:ext>
-            </a:extLst>
-          </a:blip>
-          <a:stretch>
-            <a:fillRect/>
-          </a:stretch>
-        </p:blipFill>
-        <p:spPr>
-          <a:xfrm>
-            <a:off x="1097280" y="3891107"/>
-            <a:ext cx="10058400" cy="1865929"/>
-          </a:xfrm>
-          <a:prstGeom prst="rect">
-            <a:avLst/>
-          </a:prstGeom>
-        </p:spPr>
-      </p:pic>
-      <p:sp>
-        <p:nvSpPr>
-          <p:cNvPr id="10" name="Arrow: Right 9"/>
-          <p:cNvSpPr/>
-          <p:nvPr/>
-        </p:nvSpPr>
-        <p:spPr>
-          <a:xfrm>
-            <a:off x="5016616" y="4387844"/>
-            <a:ext cx="1744911" cy="436227"/>
-          </a:xfrm>
-          <a:prstGeom prst="rightArrow">
-            <a:avLst/>
-          </a:prstGeom>
-        </p:spPr>
-        <p:style>
-          <a:lnRef idx="2">
-            <a:schemeClr val="accent1">
-              <a:shade val="50000"/>
-            </a:schemeClr>
-          </a:lnRef>
-          <a:fillRef idx="1">
-            <a:schemeClr val="accent1"/>
-          </a:fillRef>
-          <a:effectRef idx="0">
-            <a:schemeClr val="accent1"/>
-          </a:effectRef>
-          <a:fontRef idx="minor">
-            <a:schemeClr val="lt1"/>
-          </a:fontRef>
-        </p:style>
-        <p:txBody>
-          <a:bodyPr rtlCol="0" anchor="ctr"/>
-          <a:lstStyle/>
-          <a:p>
-            <a:pPr algn="ctr"/>
-            <a:endParaRPr lang="en-US"/>
-          </a:p>
-        </p:txBody>
-      </p:sp>
-      <p:sp>
-        <p:nvSpPr>
-          <p:cNvPr id="11" name="Arrow: Right 10"/>
-          <p:cNvSpPr/>
-          <p:nvPr/>
-        </p:nvSpPr>
-        <p:spPr>
-          <a:xfrm rot="10800000">
-            <a:off x="5016616" y="4976471"/>
-            <a:ext cx="1744911" cy="436227"/>
-          </a:xfrm>
-          <a:prstGeom prst="rightArrow">
-            <a:avLst/>
-          </a:prstGeom>
-        </p:spPr>
-        <p:style>
-          <a:lnRef idx="2">
-            <a:schemeClr val="accent1">
-              <a:shade val="50000"/>
-            </a:schemeClr>
-          </a:lnRef>
-          <a:fillRef idx="1">
-            <a:schemeClr val="accent1"/>
-          </a:fillRef>
-          <a:effectRef idx="0">
-            <a:schemeClr val="accent1"/>
-          </a:effectRef>
-          <a:fontRef idx="minor">
-            <a:schemeClr val="lt1"/>
-          </a:fontRef>
-        </p:style>
-        <p:txBody>
-          <a:bodyPr rtlCol="0" anchor="ctr"/>
-          <a:lstStyle/>
-          <a:p>
-            <a:pPr algn="ctr"/>
-            <a:endParaRPr lang="en-US"/>
-          </a:p>
-        </p:txBody>
-      </p:sp>
-    </p:spTree>
-    <p:extLst>
-      <p:ext uri="{BB962C8B-B14F-4D97-AF65-F5344CB8AC3E}">
-        <p14:creationId xmlns:p14="http://schemas.microsoft.com/office/powerpoint/2010/main" val="1200501418"/>
-      </p:ext>
-    </p:extLst>
-  </p:cSld>
-  <p:clrMapOvr>
-    <a:masterClrMapping/>
-  </p:clrMapOvr>
-</p:sld>
-</file>
-
-<file path=ppt/slides/slide28.xml><?xml version="1.0" encoding="utf-8"?>
-<p:sld xmlns:a="http://schemas.openxmlformats.org/drawingml/2006/main" xmlns:r="http://schemas.openxmlformats.org/officeDocument/2006/relationships" xmlns:p="http://schemas.openxmlformats.org/presentationml/2006/main">
-  <p:cSld>
-    <p:spTree>
-      <p:nvGrpSpPr>
-        <p:cNvPr id="1" name=""/>
-        <p:cNvGrpSpPr/>
-        <p:nvPr/>
-      </p:nvGrpSpPr>
-      <p:grpSpPr>
-        <a:xfrm>
-          <a:off x="0" y="0"/>
-          <a:ext cx="0" cy="0"/>
-          <a:chOff x="0" y="0"/>
-          <a:chExt cx="0" cy="0"/>
-        </a:xfrm>
-      </p:grpSpPr>
-      <p:sp>
-        <p:nvSpPr>
-          <p:cNvPr id="2" name="Title 1"/>
-          <p:cNvSpPr>
-            <a:spLocks noGrp="1"/>
-          </p:cNvSpPr>
-          <p:nvPr>
-            <p:ph type="title"/>
-          </p:nvPr>
-        </p:nvSpPr>
-        <p:spPr/>
-        <p:txBody>
-          <a:bodyPr/>
-          <a:lstStyle/>
-          <a:p>
-            <a:r>
-              <a:rPr lang="en-US" dirty="0"/>
-              <a:t>Week by week summary</a:t>
-            </a:r>
-          </a:p>
-        </p:txBody>
-      </p:sp>
-      <p:sp>
-        <p:nvSpPr>
-          <p:cNvPr id="3" name="Content Placeholder 2"/>
-          <p:cNvSpPr>
-            <a:spLocks noGrp="1"/>
-          </p:cNvSpPr>
-          <p:nvPr>
-            <p:ph idx="1"/>
-          </p:nvPr>
-        </p:nvSpPr>
-        <p:spPr/>
-        <p:txBody>
-          <a:bodyPr/>
-          <a:lstStyle/>
-          <a:p>
-            <a:endParaRPr lang="en-US"/>
-          </a:p>
-        </p:txBody>
-      </p:sp>
-    </p:spTree>
-    <p:extLst>
-      <p:ext uri="{BB962C8B-B14F-4D97-AF65-F5344CB8AC3E}">
-        <p14:creationId xmlns:p14="http://schemas.microsoft.com/office/powerpoint/2010/main" val="4114061100"/>
-      </p:ext>
-    </p:extLst>
-  </p:cSld>
-  <p:clrMapOvr>
-    <a:masterClrMapping/>
-  </p:clrMapOvr>
-</p:sld>
-</file>
-
-<file path=ppt/slides/slide29.xml><?xml version="1.0" encoding="utf-8"?>
-<p:sld xmlns:a="http://schemas.openxmlformats.org/drawingml/2006/main" xmlns:r="http://schemas.openxmlformats.org/officeDocument/2006/relationships" xmlns:p="http://schemas.openxmlformats.org/presentationml/2006/main">
-  <p:cSld>
-    <p:spTree>
-      <p:nvGrpSpPr>
-        <p:cNvPr id="1" name=""/>
-        <p:cNvGrpSpPr/>
-        <p:nvPr/>
-      </p:nvGrpSpPr>
-      <p:grpSpPr>
-        <a:xfrm>
-          <a:off x="0" y="0"/>
-          <a:ext cx="0" cy="0"/>
-          <a:chOff x="0" y="0"/>
-          <a:chExt cx="0" cy="0"/>
-        </a:xfrm>
-      </p:grpSpPr>
-      <p:sp>
-        <p:nvSpPr>
-          <p:cNvPr id="2" name="Title 1"/>
-          <p:cNvSpPr>
-            <a:spLocks noGrp="1"/>
-          </p:cNvSpPr>
-          <p:nvPr>
-            <p:ph type="title"/>
-          </p:nvPr>
-        </p:nvSpPr>
-        <p:spPr/>
-        <p:txBody>
-          <a:bodyPr/>
-          <a:lstStyle/>
-          <a:p>
-            <a:r>
-              <a:rPr lang="en-US" dirty="0"/>
-              <a:t>Winter Week 1</a:t>
-            </a:r>
-          </a:p>
-        </p:txBody>
-      </p:sp>
-      <p:sp>
-        <p:nvSpPr>
-          <p:cNvPr id="3" name="Content Placeholder 2"/>
-          <p:cNvSpPr>
-            <a:spLocks noGrp="1"/>
-          </p:cNvSpPr>
-          <p:nvPr>
-            <p:ph idx="1"/>
-          </p:nvPr>
-        </p:nvSpPr>
-        <p:spPr/>
-        <p:txBody>
-          <a:bodyPr/>
-          <a:lstStyle/>
-          <a:p>
-            <a:endParaRPr lang="en-US" dirty="0"/>
-          </a:p>
-        </p:txBody>
-      </p:sp>
-    </p:spTree>
-    <p:extLst>
-      <p:ext uri="{BB962C8B-B14F-4D97-AF65-F5344CB8AC3E}">
-        <p14:creationId xmlns:p14="http://schemas.microsoft.com/office/powerpoint/2010/main" val="3357475344"/>
       </p:ext>
     </p:extLst>
   </p:cSld>
@@ -6403,7 +6396,7 @@
           <a:p>
             <a:r>
               <a:rPr lang="en-US" dirty="0"/>
-              <a:t>Winter Week 2</a:t>
+              <a:t>3-Legged Authentication</a:t>
             </a:r>
           </a:p>
         </p:txBody>
@@ -6423,17 +6416,164 @@
           <a:bodyPr/>
           <a:lstStyle/>
           <a:p>
-            <a:pPr marL="457200" lvl="1" indent="0">
-              <a:buNone/>
-            </a:pPr>
+            <a:r>
+              <a:rPr lang="en-US" dirty="0" err="1"/>
+              <a:t>Url</a:t>
+            </a:r>
+            <a:r>
+              <a:rPr lang="en-US" dirty="0"/>
+              <a:t> </a:t>
+            </a:r>
+            <a:r>
+              <a:rPr lang="en-US" dirty="0" err="1"/>
+              <a:t>matchs</a:t>
+            </a:r>
+            <a:r>
+              <a:rPr lang="en-US" dirty="0"/>
+              <a:t> and calls function to give </a:t>
+            </a:r>
+            <a:r>
+              <a:rPr lang="en-US" dirty="0" err="1"/>
+              <a:t>url</a:t>
+            </a:r>
+            <a:r>
+              <a:rPr lang="en-US" dirty="0"/>
+              <a:t> that redirects to Autodesk</a:t>
+            </a:r>
+          </a:p>
+          <a:p>
+            <a:r>
+              <a:rPr lang="en-US" dirty="0"/>
+              <a:t>Receive URL and redirect to Autodesk to receive token.</a:t>
+            </a:r>
+          </a:p>
+          <a:p>
+            <a:r>
+              <a:rPr lang="en-US" dirty="0"/>
+              <a:t>Not Working as </a:t>
+            </a:r>
+            <a:r>
+              <a:rPr lang="en-US"/>
+              <a:t>it should…</a:t>
+            </a:r>
             <a:endParaRPr lang="en-US" dirty="0"/>
+          </a:p>
+        </p:txBody>
+      </p:sp>
+      <p:pic>
+        <p:nvPicPr>
+          <p:cNvPr id="9" name="Content Placeholder 3"/>
+          <p:cNvPicPr>
+            <a:picLocks noChangeAspect="1"/>
+          </p:cNvPicPr>
+          <p:nvPr/>
+        </p:nvPicPr>
+        <p:blipFill>
+          <a:blip r:embed="rId2">
+            <a:extLst>
+              <a:ext uri="{28A0092B-C50C-407E-A947-70E740481C1C}">
+                <a14:useLocalDpi xmlns:a14="http://schemas.microsoft.com/office/drawing/2010/main" val="0"/>
+              </a:ext>
+            </a:extLst>
+          </a:blip>
+          <a:stretch>
+            <a:fillRect/>
+          </a:stretch>
+        </p:blipFill>
+        <p:spPr>
+          <a:xfrm>
+            <a:off x="1097280" y="3891107"/>
+            <a:ext cx="10058400" cy="1865929"/>
+          </a:xfrm>
+          <a:prstGeom prst="rect">
+            <a:avLst/>
+          </a:prstGeom>
+        </p:spPr>
+      </p:pic>
+      <p:sp>
+        <p:nvSpPr>
+          <p:cNvPr id="10" name="Arrow: Right 9"/>
+          <p:cNvSpPr/>
+          <p:nvPr/>
+        </p:nvSpPr>
+        <p:spPr>
+          <a:xfrm>
+            <a:off x="5016616" y="4387844"/>
+            <a:ext cx="1744911" cy="436227"/>
+          </a:xfrm>
+          <a:prstGeom prst="rightArrow">
+            <a:avLst/>
+          </a:prstGeom>
+        </p:spPr>
+        <p:style>
+          <a:lnRef idx="2">
+            <a:schemeClr val="accent1">
+              <a:shade val="50000"/>
+            </a:schemeClr>
+          </a:lnRef>
+          <a:fillRef idx="1">
+            <a:schemeClr val="accent1"/>
+          </a:fillRef>
+          <a:effectRef idx="0">
+            <a:schemeClr val="accent1"/>
+          </a:effectRef>
+          <a:fontRef idx="minor">
+            <a:schemeClr val="lt1"/>
+          </a:fontRef>
+        </p:style>
+        <p:txBody>
+          <a:bodyPr rtlCol="0" anchor="ctr"/>
+          <a:lstStyle/>
+          <a:p>
+            <a:pPr algn="ctr"/>
+            <a:endParaRPr lang="en-US"/>
+          </a:p>
+        </p:txBody>
+      </p:sp>
+      <p:sp>
+        <p:nvSpPr>
+          <p:cNvPr id="11" name="Arrow: Right 10"/>
+          <p:cNvSpPr/>
+          <p:nvPr/>
+        </p:nvSpPr>
+        <p:spPr>
+          <a:xfrm rot="10800000">
+            <a:off x="5016616" y="4976471"/>
+            <a:ext cx="1744911" cy="436227"/>
+          </a:xfrm>
+          <a:prstGeom prst="rightArrow">
+            <a:avLst/>
+          </a:prstGeom>
+        </p:spPr>
+        <p:style>
+          <a:lnRef idx="2">
+            <a:schemeClr val="accent1">
+              <a:shade val="50000"/>
+            </a:schemeClr>
+          </a:lnRef>
+          <a:fillRef idx="1">
+            <a:schemeClr val="accent1"/>
+          </a:fillRef>
+          <a:effectRef idx="0">
+            <a:schemeClr val="accent1"/>
+          </a:effectRef>
+          <a:fontRef idx="minor">
+            <a:schemeClr val="lt1"/>
+          </a:fontRef>
+        </p:style>
+        <p:txBody>
+          <a:bodyPr rtlCol="0" anchor="ctr"/>
+          <a:lstStyle/>
+          <a:p>
+            <a:pPr algn="ctr"/>
+            <a:endParaRPr lang="en-US"/>
           </a:p>
         </p:txBody>
       </p:sp>
     </p:spTree>
     <p:extLst>
       <p:ext uri="{BB962C8B-B14F-4D97-AF65-F5344CB8AC3E}">
-        <p14:creationId xmlns:p14="http://schemas.microsoft.com/office/powerpoint/2010/main" val="3816315661"/>
+        <p14:creationId xmlns:p14="http://schemas.microsoft.com/office/powerpoint/2010/main" val="1200501418"/>
       </p:ext>
     </p:extLst>
   </p:cSld>
@@ -6477,7 +6617,7 @@
           <a:p>
             <a:r>
               <a:rPr lang="en-US" dirty="0"/>
-              <a:t>Winter Week 3</a:t>
+              <a:t>Non Local File Navigation</a:t>
             </a:r>
           </a:p>
         </p:txBody>
@@ -6497,14 +6637,35 @@
           <a:bodyPr/>
           <a:lstStyle/>
           <a:p>
-            <a:endParaRPr lang="en-US" dirty="0"/>
+            <a:r>
+              <a:rPr lang="en-US" dirty="0"/>
+              <a:t>Displayed in a file tree</a:t>
+            </a:r>
+          </a:p>
+          <a:p>
+            <a:r>
+              <a:rPr lang="en-US" dirty="0"/>
+              <a:t>User will be able to navigate to any files in their online storage from Autodesk</a:t>
+            </a:r>
+          </a:p>
+          <a:p>
+            <a:r>
+              <a:rPr lang="en-US" dirty="0"/>
+              <a:t>Selected Files willed be uploaded to the website</a:t>
+            </a:r>
+          </a:p>
+          <a:p>
+            <a:r>
+              <a:rPr lang="en-US" dirty="0"/>
+              <a:t>Autodesk API being used</a:t>
+            </a:r>
           </a:p>
         </p:txBody>
       </p:sp>
     </p:spTree>
     <p:extLst>
       <p:ext uri="{BB962C8B-B14F-4D97-AF65-F5344CB8AC3E}">
-        <p14:creationId xmlns:p14="http://schemas.microsoft.com/office/powerpoint/2010/main" val="1610455051"/>
+        <p14:creationId xmlns:p14="http://schemas.microsoft.com/office/powerpoint/2010/main" val="266852586"/>
       </p:ext>
     </p:extLst>
   </p:cSld>
@@ -6548,7 +6709,7 @@
           <a:p>
             <a:r>
               <a:rPr lang="en-US" dirty="0"/>
-              <a:t>Winter Week 4</a:t>
+              <a:t>Week by week summary</a:t>
             </a:r>
           </a:p>
         </p:txBody>
@@ -6568,14 +6729,14 @@
           <a:bodyPr/>
           <a:lstStyle/>
           <a:p>
-            <a:endParaRPr lang="en-US" dirty="0"/>
+            <a:endParaRPr lang="en-US"/>
           </a:p>
         </p:txBody>
       </p:sp>
     </p:spTree>
     <p:extLst>
       <p:ext uri="{BB962C8B-B14F-4D97-AF65-F5344CB8AC3E}">
-        <p14:creationId xmlns:p14="http://schemas.microsoft.com/office/powerpoint/2010/main" val="270471938"/>
+        <p14:creationId xmlns:p14="http://schemas.microsoft.com/office/powerpoint/2010/main" val="4114061100"/>
       </p:ext>
     </p:extLst>
   </p:cSld>
@@ -6619,7 +6780,7 @@
           <a:p>
             <a:r>
               <a:rPr lang="en-US" dirty="0"/>
-              <a:t>Winter Week 5</a:t>
+              <a:t>Winter Week 1</a:t>
             </a:r>
           </a:p>
         </p:txBody>
@@ -6638,6 +6799,18 @@
         <p:txBody>
           <a:bodyPr/>
           <a:lstStyle/>
+          <a:p>
+            <a:r>
+              <a:rPr lang="en-US" dirty="0"/>
+              <a:t>Began to get the website set up</a:t>
+            </a:r>
+          </a:p>
+          <a:p>
+            <a:r>
+              <a:rPr lang="en-US" dirty="0"/>
+              <a:t>Planned on using github.io</a:t>
+            </a:r>
+          </a:p>
           <a:p>
             <a:endParaRPr lang="en-US" dirty="0"/>
           </a:p>
@@ -6646,7 +6819,7 @@
     </p:spTree>
     <p:extLst>
       <p:ext uri="{BB962C8B-B14F-4D97-AF65-F5344CB8AC3E}">
-        <p14:creationId xmlns:p14="http://schemas.microsoft.com/office/powerpoint/2010/main" val="4206706309"/>
+        <p14:creationId xmlns:p14="http://schemas.microsoft.com/office/powerpoint/2010/main" val="3357475344"/>
       </p:ext>
     </p:extLst>
   </p:cSld>
@@ -6690,6 +6863,391 @@
           <a:p>
             <a:r>
               <a:rPr lang="en-US" dirty="0"/>
+              <a:t>Winter Week 2</a:t>
+            </a:r>
+          </a:p>
+        </p:txBody>
+      </p:sp>
+      <p:sp>
+        <p:nvSpPr>
+          <p:cNvPr id="3" name="Content Placeholder 2"/>
+          <p:cNvSpPr>
+            <a:spLocks noGrp="1"/>
+          </p:cNvSpPr>
+          <p:nvPr>
+            <p:ph idx="1"/>
+          </p:nvPr>
+        </p:nvSpPr>
+        <p:spPr/>
+        <p:txBody>
+          <a:bodyPr/>
+          <a:lstStyle/>
+          <a:p>
+            <a:pPr marL="457200" lvl="1" indent="0">
+              <a:buNone/>
+            </a:pPr>
+            <a:r>
+              <a:rPr lang="en-US" dirty="0"/>
+              <a:t>Website was more difficult to get setup than we initially thought</a:t>
+            </a:r>
+          </a:p>
+          <a:p>
+            <a:pPr marL="457200" lvl="1" indent="0">
+              <a:buNone/>
+            </a:pPr>
+            <a:r>
+              <a:rPr lang="en-US" dirty="0"/>
+              <a:t>switched from using github.io to </a:t>
+            </a:r>
+            <a:r>
+              <a:rPr lang="en-US" dirty="0" err="1"/>
+              <a:t>heroku</a:t>
+            </a:r>
+            <a:r>
+              <a:rPr lang="en-US" dirty="0"/>
+              <a:t> for server needs</a:t>
+            </a:r>
+          </a:p>
+          <a:p>
+            <a:pPr marL="457200" lvl="1" indent="0">
+              <a:buNone/>
+            </a:pPr>
+            <a:r>
+              <a:rPr lang="en-US" dirty="0"/>
+              <a:t>Had to swap out credentials to get site to work properly</a:t>
+            </a:r>
+          </a:p>
+          <a:p>
+            <a:pPr marL="457200" lvl="1" indent="0">
+              <a:buNone/>
+            </a:pPr>
+            <a:r>
+              <a:rPr lang="en-US" dirty="0"/>
+              <a:t>Site up and running</a:t>
+            </a:r>
+          </a:p>
+        </p:txBody>
+      </p:sp>
+    </p:spTree>
+    <p:extLst>
+      <p:ext uri="{BB962C8B-B14F-4D97-AF65-F5344CB8AC3E}">
+        <p14:creationId xmlns:p14="http://schemas.microsoft.com/office/powerpoint/2010/main" val="3816315661"/>
+      </p:ext>
+    </p:extLst>
+  </p:cSld>
+  <p:clrMapOvr>
+    <a:masterClrMapping/>
+  </p:clrMapOvr>
+</p:sld>
+</file>
+
+<file path=ppt/slides/slide35.xml><?xml version="1.0" encoding="utf-8"?>
+<p:sld xmlns:a="http://schemas.openxmlformats.org/drawingml/2006/main" xmlns:r="http://schemas.openxmlformats.org/officeDocument/2006/relationships" xmlns:p="http://schemas.openxmlformats.org/presentationml/2006/main">
+  <p:cSld>
+    <p:spTree>
+      <p:nvGrpSpPr>
+        <p:cNvPr id="1" name=""/>
+        <p:cNvGrpSpPr/>
+        <p:nvPr/>
+      </p:nvGrpSpPr>
+      <p:grpSpPr>
+        <a:xfrm>
+          <a:off x="0" y="0"/>
+          <a:ext cx="0" cy="0"/>
+          <a:chOff x="0" y="0"/>
+          <a:chExt cx="0" cy="0"/>
+        </a:xfrm>
+      </p:grpSpPr>
+      <p:sp>
+        <p:nvSpPr>
+          <p:cNvPr id="2" name="Title 1"/>
+          <p:cNvSpPr>
+            <a:spLocks noGrp="1"/>
+          </p:cNvSpPr>
+          <p:nvPr>
+            <p:ph type="title"/>
+          </p:nvPr>
+        </p:nvSpPr>
+        <p:spPr/>
+        <p:txBody>
+          <a:bodyPr/>
+          <a:lstStyle/>
+          <a:p>
+            <a:r>
+              <a:rPr lang="en-US" dirty="0"/>
+              <a:t>Winter Week 3</a:t>
+            </a:r>
+          </a:p>
+        </p:txBody>
+      </p:sp>
+      <p:sp>
+        <p:nvSpPr>
+          <p:cNvPr id="3" name="Content Placeholder 2"/>
+          <p:cNvSpPr>
+            <a:spLocks noGrp="1"/>
+          </p:cNvSpPr>
+          <p:nvPr>
+            <p:ph idx="1"/>
+          </p:nvPr>
+        </p:nvSpPr>
+        <p:spPr/>
+        <p:txBody>
+          <a:bodyPr/>
+          <a:lstStyle/>
+          <a:p>
+            <a:r>
+              <a:rPr lang="en-US" dirty="0"/>
+              <a:t>Troubles setting up file bucket (never used curl before)</a:t>
+            </a:r>
+          </a:p>
+          <a:p>
+            <a:r>
+              <a:rPr lang="en-US" dirty="0"/>
+              <a:t>Got the bucket setup that will hold the files</a:t>
+            </a:r>
+          </a:p>
+          <a:p>
+            <a:r>
+              <a:rPr lang="en-US" dirty="0"/>
+              <a:t>Met with Kean and Patti</a:t>
+            </a:r>
+          </a:p>
+        </p:txBody>
+      </p:sp>
+    </p:spTree>
+    <p:extLst>
+      <p:ext uri="{BB962C8B-B14F-4D97-AF65-F5344CB8AC3E}">
+        <p14:creationId xmlns:p14="http://schemas.microsoft.com/office/powerpoint/2010/main" val="1610455051"/>
+      </p:ext>
+    </p:extLst>
+  </p:cSld>
+  <p:clrMapOvr>
+    <a:masterClrMapping/>
+  </p:clrMapOvr>
+</p:sld>
+</file>
+
+<file path=ppt/slides/slide36.xml><?xml version="1.0" encoding="utf-8"?>
+<p:sld xmlns:a="http://schemas.openxmlformats.org/drawingml/2006/main" xmlns:r="http://schemas.openxmlformats.org/officeDocument/2006/relationships" xmlns:p="http://schemas.openxmlformats.org/presentationml/2006/main">
+  <p:cSld>
+    <p:spTree>
+      <p:nvGrpSpPr>
+        <p:cNvPr id="1" name=""/>
+        <p:cNvGrpSpPr/>
+        <p:nvPr/>
+      </p:nvGrpSpPr>
+      <p:grpSpPr>
+        <a:xfrm>
+          <a:off x="0" y="0"/>
+          <a:ext cx="0" cy="0"/>
+          <a:chOff x="0" y="0"/>
+          <a:chExt cx="0" cy="0"/>
+        </a:xfrm>
+      </p:grpSpPr>
+      <p:sp>
+        <p:nvSpPr>
+          <p:cNvPr id="2" name="Title 1"/>
+          <p:cNvSpPr>
+            <a:spLocks noGrp="1"/>
+          </p:cNvSpPr>
+          <p:nvPr>
+            <p:ph type="title"/>
+          </p:nvPr>
+        </p:nvSpPr>
+        <p:spPr/>
+        <p:txBody>
+          <a:bodyPr/>
+          <a:lstStyle/>
+          <a:p>
+            <a:r>
+              <a:rPr lang="en-US" dirty="0"/>
+              <a:t>Winter Week 4</a:t>
+            </a:r>
+          </a:p>
+        </p:txBody>
+      </p:sp>
+      <p:sp>
+        <p:nvSpPr>
+          <p:cNvPr id="3" name="Content Placeholder 2"/>
+          <p:cNvSpPr>
+            <a:spLocks noGrp="1"/>
+          </p:cNvSpPr>
+          <p:nvPr>
+            <p:ph idx="1"/>
+          </p:nvPr>
+        </p:nvSpPr>
+        <p:spPr/>
+        <p:txBody>
+          <a:bodyPr/>
+          <a:lstStyle/>
+          <a:p>
+            <a:r>
+              <a:rPr lang="en-US" dirty="0"/>
+              <a:t>Local file restriction complete</a:t>
+            </a:r>
+          </a:p>
+          <a:p>
+            <a:r>
+              <a:rPr lang="en-US" dirty="0"/>
+              <a:t>Began working on 3-legged Authentication</a:t>
+            </a:r>
+          </a:p>
+          <a:p>
+            <a:r>
+              <a:rPr lang="en-US" dirty="0"/>
+              <a:t>Found this would be very hard to do from scratch</a:t>
+            </a:r>
+          </a:p>
+          <a:p>
+            <a:r>
+              <a:rPr lang="en-US" dirty="0"/>
+              <a:t>Found an API that did exactly what we want</a:t>
+            </a:r>
+          </a:p>
+          <a:p>
+            <a:r>
+              <a:rPr lang="en-US" dirty="0"/>
+              <a:t>Spoke with Kean about the API we found and decided it would be best to integrate that</a:t>
+            </a:r>
+          </a:p>
+          <a:p>
+            <a:endParaRPr lang="en-US" dirty="0"/>
+          </a:p>
+        </p:txBody>
+      </p:sp>
+    </p:spTree>
+    <p:extLst>
+      <p:ext uri="{BB962C8B-B14F-4D97-AF65-F5344CB8AC3E}">
+        <p14:creationId xmlns:p14="http://schemas.microsoft.com/office/powerpoint/2010/main" val="270471938"/>
+      </p:ext>
+    </p:extLst>
+  </p:cSld>
+  <p:clrMapOvr>
+    <a:masterClrMapping/>
+  </p:clrMapOvr>
+</p:sld>
+</file>
+
+<file path=ppt/slides/slide37.xml><?xml version="1.0" encoding="utf-8"?>
+<p:sld xmlns:a="http://schemas.openxmlformats.org/drawingml/2006/main" xmlns:r="http://schemas.openxmlformats.org/officeDocument/2006/relationships" xmlns:p="http://schemas.openxmlformats.org/presentationml/2006/main">
+  <p:cSld>
+    <p:spTree>
+      <p:nvGrpSpPr>
+        <p:cNvPr id="1" name=""/>
+        <p:cNvGrpSpPr/>
+        <p:nvPr/>
+      </p:nvGrpSpPr>
+      <p:grpSpPr>
+        <a:xfrm>
+          <a:off x="0" y="0"/>
+          <a:ext cx="0" cy="0"/>
+          <a:chOff x="0" y="0"/>
+          <a:chExt cx="0" cy="0"/>
+        </a:xfrm>
+      </p:grpSpPr>
+      <p:sp>
+        <p:nvSpPr>
+          <p:cNvPr id="2" name="Title 1"/>
+          <p:cNvSpPr>
+            <a:spLocks noGrp="1"/>
+          </p:cNvSpPr>
+          <p:nvPr>
+            <p:ph type="title"/>
+          </p:nvPr>
+        </p:nvSpPr>
+        <p:spPr/>
+        <p:txBody>
+          <a:bodyPr/>
+          <a:lstStyle/>
+          <a:p>
+            <a:r>
+              <a:rPr lang="en-US" dirty="0"/>
+              <a:t>Winter Week 5</a:t>
+            </a:r>
+          </a:p>
+        </p:txBody>
+      </p:sp>
+      <p:sp>
+        <p:nvSpPr>
+          <p:cNvPr id="3" name="Content Placeholder 2"/>
+          <p:cNvSpPr>
+            <a:spLocks noGrp="1"/>
+          </p:cNvSpPr>
+          <p:nvPr>
+            <p:ph idx="1"/>
+          </p:nvPr>
+        </p:nvSpPr>
+        <p:spPr/>
+        <p:txBody>
+          <a:bodyPr/>
+          <a:lstStyle/>
+          <a:p>
+            <a:r>
+              <a:rPr lang="en-US" dirty="0"/>
+              <a:t>Began Integration of API</a:t>
+            </a:r>
+          </a:p>
+          <a:p>
+            <a:r>
+              <a:rPr lang="en-US" dirty="0"/>
+              <a:t>Ran into many problems with the integration</a:t>
+            </a:r>
+          </a:p>
+          <a:p>
+            <a:r>
+              <a:rPr lang="en-US" dirty="0"/>
+              <a:t>Kean suggested that he could bring in the person that created the API to help</a:t>
+            </a:r>
+          </a:p>
+        </p:txBody>
+      </p:sp>
+    </p:spTree>
+    <p:extLst>
+      <p:ext uri="{BB962C8B-B14F-4D97-AF65-F5344CB8AC3E}">
+        <p14:creationId xmlns:p14="http://schemas.microsoft.com/office/powerpoint/2010/main" val="4206706309"/>
+      </p:ext>
+    </p:extLst>
+  </p:cSld>
+  <p:clrMapOvr>
+    <a:masterClrMapping/>
+  </p:clrMapOvr>
+</p:sld>
+</file>
+
+<file path=ppt/slides/slide38.xml><?xml version="1.0" encoding="utf-8"?>
+<p:sld xmlns:a="http://schemas.openxmlformats.org/drawingml/2006/main" xmlns:r="http://schemas.openxmlformats.org/officeDocument/2006/relationships" xmlns:p="http://schemas.openxmlformats.org/presentationml/2006/main">
+  <p:cSld>
+    <p:spTree>
+      <p:nvGrpSpPr>
+        <p:cNvPr id="1" name=""/>
+        <p:cNvGrpSpPr/>
+        <p:nvPr/>
+      </p:nvGrpSpPr>
+      <p:grpSpPr>
+        <a:xfrm>
+          <a:off x="0" y="0"/>
+          <a:ext cx="0" cy="0"/>
+          <a:chOff x="0" y="0"/>
+          <a:chExt cx="0" cy="0"/>
+        </a:xfrm>
+      </p:grpSpPr>
+      <p:sp>
+        <p:nvSpPr>
+          <p:cNvPr id="2" name="Title 1"/>
+          <p:cNvSpPr>
+            <a:spLocks noGrp="1"/>
+          </p:cNvSpPr>
+          <p:nvPr>
+            <p:ph type="title"/>
+          </p:nvPr>
+        </p:nvSpPr>
+        <p:spPr/>
+        <p:txBody>
+          <a:bodyPr/>
+          <a:lstStyle/>
+          <a:p>
+            <a:r>
+              <a:rPr lang="en-US" dirty="0"/>
               <a:t>Winter Week 6</a:t>
             </a:r>
           </a:p>
@@ -6712,55 +7270,13 @@
           <a:p>
             <a:r>
               <a:rPr lang="en-US" dirty="0"/>
-              <a:t>Tech reviews submitted</a:t>
-            </a:r>
-          </a:p>
-          <a:p>
-            <a:pPr lvl="1"/>
-            <a:r>
-              <a:rPr lang="en-US" dirty="0"/>
-              <a:t>Not bad, could have used more time</a:t>
-            </a:r>
-          </a:p>
-          <a:p>
-            <a:pPr lvl="1"/>
-            <a:r>
-              <a:rPr lang="en-US" dirty="0"/>
-              <a:t>Good way to understand more components</a:t>
-            </a:r>
-          </a:p>
-          <a:p>
-            <a:r>
-              <a:rPr lang="en-US" dirty="0"/>
-              <a:t>Meeting with </a:t>
-            </a:r>
-            <a:r>
-              <a:rPr lang="en-US" dirty="0" err="1"/>
-              <a:t>Nels</a:t>
-            </a:r>
-            <a:r>
-              <a:rPr lang="en-US" dirty="0"/>
-              <a:t> and Patti, no Jim however</a:t>
-            </a:r>
-          </a:p>
-          <a:p>
-            <a:pPr lvl="1"/>
-            <a:r>
-              <a:rPr lang="en-US" dirty="0"/>
-              <a:t>Able to work out some more important details</a:t>
-            </a:r>
-          </a:p>
-          <a:p>
-            <a:pPr lvl="1"/>
-            <a:r>
-              <a:rPr lang="en-US" dirty="0"/>
-              <a:t>Not able to talk about performance tweaking</a:t>
-            </a:r>
-          </a:p>
-          <a:p>
-            <a:r>
-              <a:rPr lang="en-US" dirty="0"/>
-              <a:t>Overall quite productive week</a:t>
+              <a:t>Continued to work on integration</a:t>
+            </a:r>
+          </a:p>
+          <a:p>
+            <a:r>
+              <a:rPr lang="en-US" dirty="0"/>
+              <a:t>Worked on revision for documents to reflect where the project is currently</a:t>
             </a:r>
           </a:p>
         </p:txBody>
@@ -6778,7 +7294,7 @@
 </p:sld>
 </file>
 
-<file path=ppt/slides/slide35.xml><?xml version="1.0" encoding="utf-8"?>
+<file path=ppt/slides/slide39.xml><?xml version="1.0" encoding="utf-8"?>
 <p:sld xmlns:a="http://schemas.openxmlformats.org/drawingml/2006/main" xmlns:r="http://schemas.openxmlformats.org/officeDocument/2006/relationships" xmlns:p="http://schemas.openxmlformats.org/presentationml/2006/main">
   <p:cSld>
     <p:spTree>
@@ -7154,58 +7670,57 @@
           </a:lstStyle>
           <a:p>
             <a:r>
-              <a:rPr lang="en-US"/>
+              <a:rPr lang="en-US" dirty="0"/>
               <a:t>Client </a:t>
             </a:r>
           </a:p>
           <a:p>
             <a:pPr lvl="1"/>
             <a:r>
-              <a:rPr lang="en-US"/>
+              <a:rPr lang="en-US" dirty="0"/>
               <a:t>More question asking</a:t>
             </a:r>
           </a:p>
           <a:p>
             <a:pPr lvl="1"/>
             <a:r>
-              <a:rPr lang="en-US"/>
+              <a:rPr lang="en-US" dirty="0"/>
               <a:t>Weekly meetings with client?</a:t>
             </a:r>
           </a:p>
           <a:p>
             <a:r>
-              <a:rPr lang="en-US"/>
+              <a:rPr lang="en-US" dirty="0"/>
               <a:t>Team</a:t>
             </a:r>
           </a:p>
           <a:p>
             <a:pPr lvl="1"/>
             <a:r>
-              <a:rPr lang="en-US"/>
+              <a:rPr lang="en-US" dirty="0"/>
               <a:t>More planning</a:t>
             </a:r>
           </a:p>
           <a:p>
             <a:pPr lvl="2"/>
             <a:r>
-              <a:rPr lang="en-US"/>
+              <a:rPr lang="en-US" dirty="0"/>
               <a:t>Delegation?</a:t>
             </a:r>
           </a:p>
           <a:p>
             <a:pPr lvl="1"/>
             <a:r>
-              <a:rPr lang="en-US"/>
+              <a:rPr lang="en-US" dirty="0"/>
               <a:t>Weekly meetings</a:t>
             </a:r>
           </a:p>
           <a:p>
             <a:pPr lvl="1"/>
             <a:r>
-              <a:rPr lang="en-US"/>
+              <a:rPr lang="en-US" dirty="0"/>
               <a:t>Seeking help sooner</a:t>
             </a:r>
-            <a:endParaRPr lang="en-US" dirty="0"/>
           </a:p>
         </p:txBody>
       </p:sp>
@@ -7213,218 +7728,6 @@
     <p:extLst>
       <p:ext uri="{BB962C8B-B14F-4D97-AF65-F5344CB8AC3E}">
         <p14:creationId xmlns:p14="http://schemas.microsoft.com/office/powerpoint/2010/main" val="1253775864"/>
-      </p:ext>
-    </p:extLst>
-  </p:cSld>
-  <p:clrMapOvr>
-    <a:masterClrMapping/>
-  </p:clrMapOvr>
-</p:sld>
-</file>
-
-<file path=ppt/slides/slide36.xml><?xml version="1.0" encoding="utf-8"?>
-<p:sld xmlns:a="http://schemas.openxmlformats.org/drawingml/2006/main" xmlns:r="http://schemas.openxmlformats.org/officeDocument/2006/relationships" xmlns:p="http://schemas.openxmlformats.org/presentationml/2006/main">
-  <p:cSld>
-    <p:spTree>
-      <p:nvGrpSpPr>
-        <p:cNvPr id="1" name=""/>
-        <p:cNvGrpSpPr/>
-        <p:nvPr/>
-      </p:nvGrpSpPr>
-      <p:grpSpPr>
-        <a:xfrm>
-          <a:off x="0" y="0"/>
-          <a:ext cx="0" cy="0"/>
-          <a:chOff x="0" y="0"/>
-          <a:chExt cx="0" cy="0"/>
-        </a:xfrm>
-      </p:grpSpPr>
-      <p:sp>
-        <p:nvSpPr>
-          <p:cNvPr id="2" name="Title 1"/>
-          <p:cNvSpPr>
-            <a:spLocks noGrp="1"/>
-          </p:cNvSpPr>
-          <p:nvPr>
-            <p:ph type="title"/>
-          </p:nvPr>
-        </p:nvSpPr>
-        <p:spPr/>
-        <p:txBody>
-          <a:bodyPr/>
-          <a:lstStyle/>
-          <a:p>
-            <a:r>
-              <a:rPr lang="en-US" dirty="0"/>
-              <a:t>What’s next?</a:t>
-            </a:r>
-          </a:p>
-        </p:txBody>
-      </p:sp>
-      <p:sp>
-        <p:nvSpPr>
-          <p:cNvPr id="3" name="Content Placeholder 2"/>
-          <p:cNvSpPr>
-            <a:spLocks noGrp="1"/>
-          </p:cNvSpPr>
-          <p:nvPr>
-            <p:ph idx="1"/>
-          </p:nvPr>
-        </p:nvSpPr>
-        <p:spPr/>
-        <p:txBody>
-          <a:bodyPr/>
-          <a:lstStyle/>
-          <a:p>
-            <a:r>
-              <a:rPr lang="en-US" dirty="0"/>
-              <a:t>Start using API’s and Vrok.it!</a:t>
-            </a:r>
-          </a:p>
-          <a:p>
-            <a:pPr lvl="1"/>
-            <a:r>
-              <a:rPr lang="en-US" dirty="0"/>
-              <a:t>Actual code implementation?</a:t>
-            </a:r>
-          </a:p>
-          <a:p>
-            <a:pPr lvl="1"/>
-            <a:r>
-              <a:rPr lang="en-US" dirty="0"/>
-              <a:t>Might need to work out a couple details like…</a:t>
-            </a:r>
-          </a:p>
-          <a:p>
-            <a:pPr lvl="2"/>
-            <a:r>
-              <a:rPr lang="en-US" dirty="0"/>
-              <a:t>Website hosting</a:t>
-            </a:r>
-          </a:p>
-          <a:p>
-            <a:pPr lvl="2"/>
-            <a:r>
-              <a:rPr lang="en-US" dirty="0"/>
-              <a:t>Work load break up</a:t>
-            </a:r>
-          </a:p>
-          <a:p>
-            <a:pPr lvl="2"/>
-            <a:r>
-              <a:rPr lang="en-US" dirty="0"/>
-              <a:t>Reports to Patti about API usage?</a:t>
-            </a:r>
-          </a:p>
-          <a:p>
-            <a:pPr lvl="2"/>
-            <a:endParaRPr lang="en-US" dirty="0"/>
-          </a:p>
-          <a:p>
-            <a:r>
-              <a:rPr lang="en-US" dirty="0"/>
-              <a:t>Client meeting January 11th</a:t>
-            </a:r>
-          </a:p>
-          <a:p>
-            <a:pPr lvl="2"/>
-            <a:endParaRPr lang="en-US" dirty="0"/>
-          </a:p>
-        </p:txBody>
-      </p:sp>
-    </p:spTree>
-    <p:extLst>
-      <p:ext uri="{BB962C8B-B14F-4D97-AF65-F5344CB8AC3E}">
-        <p14:creationId xmlns:p14="http://schemas.microsoft.com/office/powerpoint/2010/main" val="2560867298"/>
-      </p:ext>
-    </p:extLst>
-  </p:cSld>
-  <p:clrMapOvr>
-    <a:masterClrMapping/>
-  </p:clrMapOvr>
-</p:sld>
-</file>
-
-<file path=ppt/slides/slide37.xml><?xml version="1.0" encoding="utf-8"?>
-<p:sld xmlns:a="http://schemas.openxmlformats.org/drawingml/2006/main" xmlns:r="http://schemas.openxmlformats.org/officeDocument/2006/relationships" xmlns:p="http://schemas.openxmlformats.org/presentationml/2006/main">
-  <p:cSld>
-    <p:spTree>
-      <p:nvGrpSpPr>
-        <p:cNvPr id="1" name=""/>
-        <p:cNvGrpSpPr/>
-        <p:nvPr/>
-      </p:nvGrpSpPr>
-      <p:grpSpPr>
-        <a:xfrm>
-          <a:off x="0" y="0"/>
-          <a:ext cx="0" cy="0"/>
-          <a:chOff x="0" y="0"/>
-          <a:chExt cx="0" cy="0"/>
-        </a:xfrm>
-      </p:grpSpPr>
-      <p:sp>
-        <p:nvSpPr>
-          <p:cNvPr id="2" name="Title 1"/>
-          <p:cNvSpPr>
-            <a:spLocks noGrp="1"/>
-          </p:cNvSpPr>
-          <p:nvPr>
-            <p:ph type="title"/>
-          </p:nvPr>
-        </p:nvSpPr>
-        <p:spPr/>
-        <p:txBody>
-          <a:bodyPr/>
-          <a:lstStyle/>
-          <a:p>
-            <a:r>
-              <a:rPr lang="en-US" dirty="0"/>
-              <a:t>References</a:t>
-            </a:r>
-          </a:p>
-        </p:txBody>
-      </p:sp>
-      <p:sp>
-        <p:nvSpPr>
-          <p:cNvPr id="3" name="Content Placeholder 2"/>
-          <p:cNvSpPr>
-            <a:spLocks noGrp="1"/>
-          </p:cNvSpPr>
-          <p:nvPr>
-            <p:ph idx="1"/>
-          </p:nvPr>
-        </p:nvSpPr>
-        <p:spPr/>
-        <p:txBody>
-          <a:bodyPr/>
-          <a:lstStyle/>
-          <a:p>
-            <a:r>
-              <a:rPr lang="en-US" dirty="0">
-                <a:hlinkClick r:id="rId2"/>
-              </a:rPr>
-              <a:t>https://developer.autodesk.com/</a:t>
-            </a:r>
-            <a:endParaRPr lang="en-US" dirty="0"/>
-          </a:p>
-          <a:p>
-            <a:r>
-              <a:rPr lang="en-US" dirty="0"/>
-              <a:t>https://github.com/KeanW/vrok-it</a:t>
-            </a:r>
-          </a:p>
-          <a:p>
-            <a:r>
-              <a:rPr lang="en-US" dirty="0"/>
-              <a:t>https://github.com/Autodesk-Forge/model.derivative-nodejs-sample</a:t>
-            </a:r>
-          </a:p>
-        </p:txBody>
-      </p:sp>
-    </p:spTree>
-    <p:extLst>
-      <p:ext uri="{BB962C8B-B14F-4D97-AF65-F5344CB8AC3E}">
-        <p14:creationId xmlns:p14="http://schemas.microsoft.com/office/powerpoint/2010/main" val="1099164323"/>
       </p:ext>
     </p:extLst>
   </p:cSld>
@@ -7523,6 +7826,191 @@
     <p:extLst>
       <p:ext uri="{BB962C8B-B14F-4D97-AF65-F5344CB8AC3E}">
         <p14:creationId xmlns:p14="http://schemas.microsoft.com/office/powerpoint/2010/main" val="2310746045"/>
+      </p:ext>
+    </p:extLst>
+  </p:cSld>
+  <p:clrMapOvr>
+    <a:masterClrMapping/>
+  </p:clrMapOvr>
+</p:sld>
+</file>
+
+<file path=ppt/slides/slide40.xml><?xml version="1.0" encoding="utf-8"?>
+<p:sld xmlns:a="http://schemas.openxmlformats.org/drawingml/2006/main" xmlns:r="http://schemas.openxmlformats.org/officeDocument/2006/relationships" xmlns:p="http://schemas.openxmlformats.org/presentationml/2006/main">
+  <p:cSld>
+    <p:spTree>
+      <p:nvGrpSpPr>
+        <p:cNvPr id="1" name=""/>
+        <p:cNvGrpSpPr/>
+        <p:nvPr/>
+      </p:nvGrpSpPr>
+      <p:grpSpPr>
+        <a:xfrm>
+          <a:off x="0" y="0"/>
+          <a:ext cx="0" cy="0"/>
+          <a:chOff x="0" y="0"/>
+          <a:chExt cx="0" cy="0"/>
+        </a:xfrm>
+      </p:grpSpPr>
+      <p:sp>
+        <p:nvSpPr>
+          <p:cNvPr id="2" name="Title 1"/>
+          <p:cNvSpPr>
+            <a:spLocks noGrp="1"/>
+          </p:cNvSpPr>
+          <p:nvPr>
+            <p:ph type="title"/>
+          </p:nvPr>
+        </p:nvSpPr>
+        <p:spPr/>
+        <p:txBody>
+          <a:bodyPr/>
+          <a:lstStyle/>
+          <a:p>
+            <a:r>
+              <a:rPr lang="en-US" dirty="0"/>
+              <a:t>What’s next?</a:t>
+            </a:r>
+          </a:p>
+        </p:txBody>
+      </p:sp>
+      <p:sp>
+        <p:nvSpPr>
+          <p:cNvPr id="3" name="Content Placeholder 2"/>
+          <p:cNvSpPr>
+            <a:spLocks noGrp="1"/>
+          </p:cNvSpPr>
+          <p:nvPr>
+            <p:ph idx="1"/>
+          </p:nvPr>
+        </p:nvSpPr>
+        <p:spPr/>
+        <p:txBody>
+          <a:bodyPr/>
+          <a:lstStyle/>
+          <a:p>
+            <a:r>
+              <a:rPr lang="en-US" dirty="0"/>
+              <a:t>Finish the integration of the API</a:t>
+            </a:r>
+          </a:p>
+          <a:p>
+            <a:r>
+              <a:rPr lang="en-US" dirty="0"/>
+              <a:t>Begin changes to the UI</a:t>
+            </a:r>
+          </a:p>
+          <a:p>
+            <a:r>
+              <a:rPr lang="en-US" dirty="0"/>
+              <a:t>Testing?</a:t>
+            </a:r>
+          </a:p>
+          <a:p>
+            <a:pPr lvl="2"/>
+            <a:endParaRPr lang="en-US" dirty="0"/>
+          </a:p>
+        </p:txBody>
+      </p:sp>
+    </p:spTree>
+    <p:extLst>
+      <p:ext uri="{BB962C8B-B14F-4D97-AF65-F5344CB8AC3E}">
+        <p14:creationId xmlns:p14="http://schemas.microsoft.com/office/powerpoint/2010/main" val="2560867298"/>
+      </p:ext>
+    </p:extLst>
+  </p:cSld>
+  <p:clrMapOvr>
+    <a:masterClrMapping/>
+  </p:clrMapOvr>
+</p:sld>
+</file>
+
+<file path=ppt/slides/slide41.xml><?xml version="1.0" encoding="utf-8"?>
+<p:sld xmlns:a="http://schemas.openxmlformats.org/drawingml/2006/main" xmlns:r="http://schemas.openxmlformats.org/officeDocument/2006/relationships" xmlns:p="http://schemas.openxmlformats.org/presentationml/2006/main">
+  <p:cSld>
+    <p:spTree>
+      <p:nvGrpSpPr>
+        <p:cNvPr id="1" name=""/>
+        <p:cNvGrpSpPr/>
+        <p:nvPr/>
+      </p:nvGrpSpPr>
+      <p:grpSpPr>
+        <a:xfrm>
+          <a:off x="0" y="0"/>
+          <a:ext cx="0" cy="0"/>
+          <a:chOff x="0" y="0"/>
+          <a:chExt cx="0" cy="0"/>
+        </a:xfrm>
+      </p:grpSpPr>
+      <p:sp>
+        <p:nvSpPr>
+          <p:cNvPr id="2" name="Title 1"/>
+          <p:cNvSpPr>
+            <a:spLocks noGrp="1"/>
+          </p:cNvSpPr>
+          <p:nvPr>
+            <p:ph type="title"/>
+          </p:nvPr>
+        </p:nvSpPr>
+        <p:spPr/>
+        <p:txBody>
+          <a:bodyPr/>
+          <a:lstStyle/>
+          <a:p>
+            <a:r>
+              <a:rPr lang="en-US" dirty="0"/>
+              <a:t>References</a:t>
+            </a:r>
+          </a:p>
+        </p:txBody>
+      </p:sp>
+      <p:sp>
+        <p:nvSpPr>
+          <p:cNvPr id="3" name="Content Placeholder 2"/>
+          <p:cNvSpPr>
+            <a:spLocks noGrp="1"/>
+          </p:cNvSpPr>
+          <p:nvPr>
+            <p:ph idx="1"/>
+          </p:nvPr>
+        </p:nvSpPr>
+        <p:spPr/>
+        <p:txBody>
+          <a:bodyPr/>
+          <a:lstStyle/>
+          <a:p>
+            <a:r>
+              <a:rPr lang="en-US" dirty="0">
+                <a:hlinkClick r:id="rId2"/>
+              </a:rPr>
+              <a:t>https://developer.autodesk.com/</a:t>
+            </a:r>
+            <a:endParaRPr lang="en-US" dirty="0"/>
+          </a:p>
+          <a:p>
+            <a:r>
+              <a:rPr lang="en-US" dirty="0">
+                <a:hlinkClick r:id="rId3"/>
+              </a:rPr>
+              <a:t>https://github.com/KeanW/vrok-it</a:t>
+            </a:r>
+            <a:endParaRPr lang="en-US" dirty="0"/>
+          </a:p>
+          <a:p>
+            <a:r>
+              <a:rPr lang="en-US" dirty="0">
+                <a:hlinkClick r:id="rId4"/>
+              </a:rPr>
+              <a:t>https://github.com/Autodesk-Forge/model.derivative-nodejs-sample</a:t>
+            </a:r>
+            <a:endParaRPr lang="en-US" dirty="0"/>
+          </a:p>
+        </p:txBody>
+      </p:sp>
+    </p:spTree>
+    <p:extLst>
+      <p:ext uri="{BB962C8B-B14F-4D97-AF65-F5344CB8AC3E}">
+        <p14:creationId xmlns:p14="http://schemas.microsoft.com/office/powerpoint/2010/main" val="1099164323"/>
       </p:ext>
     </p:extLst>
   </p:cSld>

</xml_diff>

<commit_message>
My changes to the docs
</commit_message>
<xml_diff>
--- a/Project Documents/Progress Report 2/Progress report.pptx
+++ b/Project Documents/Progress Report 2/Progress report.pptx
@@ -378,7 +378,7 @@
           <a:p>
             <a:fld id="{B17AFAAB-B546-45EA-83F1-D6961F00B077}" type="datetimeFigureOut">
               <a:rPr lang="en-US" smtClean="0"/>
-              <a:t>2/15/2017</a:t>
+              <a:t>2/16/2017</a:t>
             </a:fld>
             <a:endParaRPr lang="en-US"/>
           </a:p>
@@ -586,7 +586,7 @@
           <a:p>
             <a:fld id="{B17AFAAB-B546-45EA-83F1-D6961F00B077}" type="datetimeFigureOut">
               <a:rPr lang="en-US" smtClean="0"/>
-              <a:t>2/15/2017</a:t>
+              <a:t>2/16/2017</a:t>
             </a:fld>
             <a:endParaRPr lang="en-US"/>
           </a:p>
@@ -842,7 +842,7 @@
           <a:p>
             <a:fld id="{B17AFAAB-B546-45EA-83F1-D6961F00B077}" type="datetimeFigureOut">
               <a:rPr lang="en-US" smtClean="0"/>
-              <a:t>2/15/2017</a:t>
+              <a:t>2/16/2017</a:t>
             </a:fld>
             <a:endParaRPr lang="en-US"/>
           </a:p>
@@ -1016,7 +1016,7 @@
           <a:p>
             <a:fld id="{B17AFAAB-B546-45EA-83F1-D6961F00B077}" type="datetimeFigureOut">
               <a:rPr lang="en-US" smtClean="0"/>
-              <a:t>2/15/2017</a:t>
+              <a:t>2/16/2017</a:t>
             </a:fld>
             <a:endParaRPr lang="en-US"/>
           </a:p>
@@ -1359,7 +1359,7 @@
           <a:p>
             <a:fld id="{B17AFAAB-B546-45EA-83F1-D6961F00B077}" type="datetimeFigureOut">
               <a:rPr lang="en-US" smtClean="0"/>
-              <a:t>2/15/2017</a:t>
+              <a:t>2/16/2017</a:t>
             </a:fld>
             <a:endParaRPr lang="en-US"/>
           </a:p>
@@ -1634,7 +1634,7 @@
           <a:p>
             <a:fld id="{B17AFAAB-B546-45EA-83F1-D6961F00B077}" type="datetimeFigureOut">
               <a:rPr lang="en-US" smtClean="0"/>
-              <a:t>2/15/2017</a:t>
+              <a:t>2/16/2017</a:t>
             </a:fld>
             <a:endParaRPr lang="en-US"/>
           </a:p>
@@ -2013,7 +2013,7 @@
           <a:p>
             <a:fld id="{B17AFAAB-B546-45EA-83F1-D6961F00B077}" type="datetimeFigureOut">
               <a:rPr lang="en-US" smtClean="0"/>
-              <a:t>2/15/2017</a:t>
+              <a:t>2/16/2017</a:t>
             </a:fld>
             <a:endParaRPr lang="en-US"/>
           </a:p>
@@ -2131,7 +2131,7 @@
           <a:p>
             <a:fld id="{B17AFAAB-B546-45EA-83F1-D6961F00B077}" type="datetimeFigureOut">
               <a:rPr lang="en-US" smtClean="0"/>
-              <a:t>2/15/2017</a:t>
+              <a:t>2/16/2017</a:t>
             </a:fld>
             <a:endParaRPr lang="en-US"/>
           </a:p>
@@ -2302,7 +2302,7 @@
           <a:p>
             <a:fld id="{B17AFAAB-B546-45EA-83F1-D6961F00B077}" type="datetimeFigureOut">
               <a:rPr lang="en-US" smtClean="0"/>
-              <a:t>2/15/2017</a:t>
+              <a:t>2/16/2017</a:t>
             </a:fld>
             <a:endParaRPr lang="en-US"/>
           </a:p>
@@ -2656,7 +2656,7 @@
           <a:p>
             <a:fld id="{B17AFAAB-B546-45EA-83F1-D6961F00B077}" type="datetimeFigureOut">
               <a:rPr lang="en-US" smtClean="0"/>
-              <a:t>2/15/2017</a:t>
+              <a:t>2/16/2017</a:t>
             </a:fld>
             <a:endParaRPr lang="en-US"/>
           </a:p>
@@ -3038,7 +3038,7 @@
           <a:p>
             <a:fld id="{B17AFAAB-B546-45EA-83F1-D6961F00B077}" type="datetimeFigureOut">
               <a:rPr lang="en-US" smtClean="0"/>
-              <a:t>2/15/2017</a:t>
+              <a:t>2/16/2017</a:t>
             </a:fld>
             <a:endParaRPr lang="en-US"/>
           </a:p>
@@ -3325,7 +3325,7 @@
           <a:p>
             <a:fld id="{B17AFAAB-B546-45EA-83F1-D6961F00B077}" type="datetimeFigureOut">
               <a:rPr lang="en-US" smtClean="0"/>
-              <a:t>2/15/2017</a:t>
+              <a:t>2/16/2017</a:t>
             </a:fld>
             <a:endParaRPr lang="en-US"/>
           </a:p>
@@ -6422,15 +6422,7 @@
             </a:r>
             <a:r>
               <a:rPr lang="en-US" dirty="0"/>
-              <a:t> </a:t>
-            </a:r>
-            <a:r>
-              <a:rPr lang="en-US" dirty="0" err="1"/>
-              <a:t>matchs</a:t>
-            </a:r>
-            <a:r>
-              <a:rPr lang="en-US" dirty="0"/>
-              <a:t> and calls function to give </a:t>
+              <a:t> matches and calls function to give </a:t>
             </a:r>
             <a:r>
               <a:rPr lang="en-US" dirty="0" err="1"/>
@@ -6450,13 +6442,8 @@
           <a:p>
             <a:r>
               <a:rPr lang="en-US" dirty="0"/>
-              <a:t>Not Working as </a:t>
-            </a:r>
-            <a:r>
-              <a:rPr lang="en-US"/>
-              <a:t>it should…</a:t>
-            </a:r>
-            <a:endParaRPr lang="en-US" dirty="0"/>
+              <a:t>Not working as it should…</a:t>
+            </a:r>
           </a:p>
         </p:txBody>
       </p:sp>

</xml_diff>

<commit_message>
more slides and tweaks
</commit_message>
<xml_diff>
--- a/Project Documents/Progress Report 2/Progress report.pptx
+++ b/Project Documents/Progress Report 2/Progress report.pptx
@@ -17,16 +17,18 @@
     <p:sldId id="302" r:id="rId11"/>
     <p:sldId id="306" r:id="rId12"/>
     <p:sldId id="307" r:id="rId13"/>
-    <p:sldId id="297" r:id="rId14"/>
-    <p:sldId id="277" r:id="rId15"/>
-    <p:sldId id="278" r:id="rId16"/>
-    <p:sldId id="279" r:id="rId17"/>
-    <p:sldId id="280" r:id="rId18"/>
-    <p:sldId id="281" r:id="rId19"/>
-    <p:sldId id="282" r:id="rId20"/>
-    <p:sldId id="293" r:id="rId21"/>
-    <p:sldId id="276" r:id="rId22"/>
-    <p:sldId id="295" r:id="rId23"/>
+    <p:sldId id="308" r:id="rId14"/>
+    <p:sldId id="297" r:id="rId15"/>
+    <p:sldId id="277" r:id="rId16"/>
+    <p:sldId id="278" r:id="rId17"/>
+    <p:sldId id="279" r:id="rId18"/>
+    <p:sldId id="280" r:id="rId19"/>
+    <p:sldId id="281" r:id="rId20"/>
+    <p:sldId id="282" r:id="rId21"/>
+    <p:sldId id="309" r:id="rId22"/>
+    <p:sldId id="293" r:id="rId23"/>
+    <p:sldId id="276" r:id="rId24"/>
+    <p:sldId id="295" r:id="rId25"/>
   </p:sldIdLst>
   <p:sldSz cx="12192000" cy="6858000"/>
   <p:notesSz cx="6858000" cy="9144000"/>
@@ -4370,7 +4372,7 @@
           <a:p>
             <a:r>
               <a:rPr lang="en-US" dirty="0"/>
-              <a:t>Week by week summary</a:t>
+              <a:t>Remaining Tasks</a:t>
             </a:r>
           </a:p>
         </p:txBody>
@@ -4390,14 +4392,68 @@
           <a:bodyPr/>
           <a:lstStyle/>
           <a:p>
-            <a:endParaRPr lang="en-US"/>
+            <a:pPr marL="201168" lvl="1" indent="0">
+              <a:buNone/>
+            </a:pPr>
+            <a:endParaRPr lang="en-US" dirty="0"/>
+          </a:p>
+          <a:p>
+            <a:pPr marL="201168" lvl="1" indent="0">
+              <a:buNone/>
+            </a:pPr>
+            <a:r>
+              <a:rPr lang="en-US" dirty="0"/>
+              <a:t>CURRENT - Authentication</a:t>
+            </a:r>
+          </a:p>
+          <a:p>
+            <a:pPr marL="201168" lvl="1" indent="0">
+              <a:buNone/>
+            </a:pPr>
+            <a:r>
+              <a:rPr lang="en-US" dirty="0"/>
+              <a:t>Data Management functional</a:t>
+            </a:r>
+          </a:p>
+          <a:p>
+            <a:pPr marL="201168" lvl="1" indent="0">
+              <a:buNone/>
+            </a:pPr>
+            <a:r>
+              <a:rPr lang="en-US" dirty="0"/>
+              <a:t>Updated UI</a:t>
+            </a:r>
+          </a:p>
+          <a:p>
+            <a:pPr marL="201168" lvl="1" indent="0">
+              <a:buNone/>
+            </a:pPr>
+            <a:r>
+              <a:rPr lang="en-US" dirty="0"/>
+              <a:t>Updated Viewer</a:t>
+            </a:r>
+          </a:p>
+          <a:p>
+            <a:pPr marL="201168" lvl="1" indent="0">
+              <a:buNone/>
+            </a:pPr>
+            <a:r>
+              <a:rPr lang="en-US" dirty="0"/>
+              <a:t>Google Cardboard </a:t>
+            </a:r>
+          </a:p>
+          <a:p>
+            <a:pPr marL="201168" lvl="1" indent="0">
+              <a:buNone/>
+            </a:pPr>
+            <a:endParaRPr lang="en-US" dirty="0"/>
           </a:p>
         </p:txBody>
       </p:sp>
     </p:spTree>
     <p:extLst>
       <p:ext uri="{BB962C8B-B14F-4D97-AF65-F5344CB8AC3E}">
-        <p14:creationId xmlns:p14="http://schemas.microsoft.com/office/powerpoint/2010/main" val="4114061100"/>
+        <p14:creationId xmlns:p14="http://schemas.microsoft.com/office/powerpoint/2010/main" val="800209894"/>
       </p:ext>
     </p:extLst>
   </p:cSld>
@@ -4441,7 +4497,7 @@
           <a:p>
             <a:r>
               <a:rPr lang="en-US" dirty="0"/>
-              <a:t>Winter Week 1</a:t>
+              <a:t>Week by week summary</a:t>
             </a:r>
           </a:p>
         </p:txBody>
@@ -4461,26 +4517,14 @@
           <a:bodyPr/>
           <a:lstStyle/>
           <a:p>
-            <a:r>
-              <a:rPr lang="en-US" dirty="0"/>
-              <a:t>Began to get the website set up</a:t>
-            </a:r>
-          </a:p>
-          <a:p>
-            <a:r>
-              <a:rPr lang="en-US" dirty="0"/>
-              <a:t>Planned on using github.io</a:t>
-            </a:r>
-          </a:p>
-          <a:p>
-            <a:endParaRPr lang="en-US" dirty="0"/>
+            <a:endParaRPr lang="en-US"/>
           </a:p>
         </p:txBody>
       </p:sp>
     </p:spTree>
     <p:extLst>
       <p:ext uri="{BB962C8B-B14F-4D97-AF65-F5344CB8AC3E}">
-        <p14:creationId xmlns:p14="http://schemas.microsoft.com/office/powerpoint/2010/main" val="3357475344"/>
+        <p14:creationId xmlns:p14="http://schemas.microsoft.com/office/powerpoint/2010/main" val="4114061100"/>
       </p:ext>
     </p:extLst>
   </p:cSld>
@@ -4524,7 +4568,7 @@
           <a:p>
             <a:r>
               <a:rPr lang="en-US" dirty="0"/>
-              <a:t>Winter Week 2</a:t>
+              <a:t>Winter Week 1</a:t>
             </a:r>
           </a:p>
         </p:txBody>
@@ -4544,55 +4588,26 @@
           <a:bodyPr/>
           <a:lstStyle/>
           <a:p>
-            <a:pPr marL="457200" lvl="1" indent="0">
-              <a:buNone/>
-            </a:pPr>
-            <a:r>
-              <a:rPr lang="en-US" dirty="0"/>
-              <a:t>Website was more difficult to get setup than we initially thought</a:t>
-            </a:r>
-          </a:p>
-          <a:p>
-            <a:pPr marL="457200" lvl="1" indent="0">
-              <a:buNone/>
-            </a:pPr>
-            <a:r>
-              <a:rPr lang="en-US" dirty="0"/>
-              <a:t>switched from using github.io to </a:t>
-            </a:r>
-            <a:r>
-              <a:rPr lang="en-US" dirty="0" err="1"/>
-              <a:t>heroku</a:t>
-            </a:r>
-            <a:r>
-              <a:rPr lang="en-US" dirty="0"/>
-              <a:t> for server needs</a:t>
-            </a:r>
-          </a:p>
-          <a:p>
-            <a:pPr marL="457200" lvl="1" indent="0">
-              <a:buNone/>
-            </a:pPr>
-            <a:r>
-              <a:rPr lang="en-US" dirty="0"/>
-              <a:t>Had to swap out credentials to get site to work properly</a:t>
-            </a:r>
-          </a:p>
-          <a:p>
-            <a:pPr marL="457200" lvl="1" indent="0">
-              <a:buNone/>
-            </a:pPr>
-            <a:r>
-              <a:rPr lang="en-US" dirty="0"/>
-              <a:t>Site up and running</a:t>
-            </a:r>
+            <a:r>
+              <a:rPr lang="en-US" dirty="0"/>
+              <a:t>Began to get the website set up</a:t>
+            </a:r>
+          </a:p>
+          <a:p>
+            <a:r>
+              <a:rPr lang="en-US" dirty="0"/>
+              <a:t>Planned on using github.io</a:t>
+            </a:r>
+          </a:p>
+          <a:p>
+            <a:endParaRPr lang="en-US" dirty="0"/>
           </a:p>
         </p:txBody>
       </p:sp>
     </p:spTree>
     <p:extLst>
       <p:ext uri="{BB962C8B-B14F-4D97-AF65-F5344CB8AC3E}">
-        <p14:creationId xmlns:p14="http://schemas.microsoft.com/office/powerpoint/2010/main" val="3816315661"/>
+        <p14:creationId xmlns:p14="http://schemas.microsoft.com/office/powerpoint/2010/main" val="3357475344"/>
       </p:ext>
     </p:extLst>
   </p:cSld>
@@ -4636,7 +4651,7 @@
           <a:p>
             <a:r>
               <a:rPr lang="en-US" dirty="0"/>
-              <a:t>Winter Week 3</a:t>
+              <a:t>Winter Week 2</a:t>
             </a:r>
           </a:p>
         </p:txBody>
@@ -4656,21 +4671,47 @@
           <a:bodyPr/>
           <a:lstStyle/>
           <a:p>
-            <a:r>
-              <a:rPr lang="en-US" dirty="0"/>
-              <a:t>Troubles setting up file bucket (never used curl before)</a:t>
-            </a:r>
-          </a:p>
-          <a:p>
-            <a:r>
-              <a:rPr lang="en-US" dirty="0"/>
-              <a:t>Got the bucket setup that will hold the files</a:t>
-            </a:r>
-          </a:p>
-          <a:p>
-            <a:r>
-              <a:rPr lang="en-US" dirty="0"/>
-              <a:t>Met with Kean and Patti</a:t>
+            <a:pPr marL="457200" lvl="1" indent="0">
+              <a:buNone/>
+            </a:pPr>
+            <a:r>
+              <a:rPr lang="en-US" dirty="0"/>
+              <a:t>Website was more difficult to get setup than we initially thought</a:t>
+            </a:r>
+          </a:p>
+          <a:p>
+            <a:pPr marL="457200" lvl="1" indent="0">
+              <a:buNone/>
+            </a:pPr>
+            <a:r>
+              <a:rPr lang="en-US" dirty="0"/>
+              <a:t>switched from using github.io to </a:t>
+            </a:r>
+            <a:r>
+              <a:rPr lang="en-US" dirty="0" err="1"/>
+              <a:t>heroku</a:t>
+            </a:r>
+            <a:r>
+              <a:rPr lang="en-US" dirty="0"/>
+              <a:t> for server needs</a:t>
+            </a:r>
+          </a:p>
+          <a:p>
+            <a:pPr marL="457200" lvl="1" indent="0">
+              <a:buNone/>
+            </a:pPr>
+            <a:r>
+              <a:rPr lang="en-US" dirty="0"/>
+              <a:t>Had to swap out credentials to get site to work properly</a:t>
+            </a:r>
+          </a:p>
+          <a:p>
+            <a:pPr marL="457200" lvl="1" indent="0">
+              <a:buNone/>
+            </a:pPr>
+            <a:r>
+              <a:rPr lang="en-US" dirty="0"/>
+              <a:t>Site up and running</a:t>
             </a:r>
           </a:p>
         </p:txBody>
@@ -4678,7 +4719,7 @@
     </p:spTree>
     <p:extLst>
       <p:ext uri="{BB962C8B-B14F-4D97-AF65-F5344CB8AC3E}">
-        <p14:creationId xmlns:p14="http://schemas.microsoft.com/office/powerpoint/2010/main" val="1610455051"/>
+        <p14:creationId xmlns:p14="http://schemas.microsoft.com/office/powerpoint/2010/main" val="3816315661"/>
       </p:ext>
     </p:extLst>
   </p:cSld>
@@ -4722,7 +4763,7 @@
           <a:p>
             <a:r>
               <a:rPr lang="en-US" dirty="0"/>
-              <a:t>Winter Week 4</a:t>
+              <a:t>Winter Week 3</a:t>
             </a:r>
           </a:p>
         </p:txBody>
@@ -4744,42 +4785,27 @@
           <a:p>
             <a:r>
               <a:rPr lang="en-US" dirty="0"/>
-              <a:t>Local file restriction complete</a:t>
-            </a:r>
-          </a:p>
-          <a:p>
-            <a:r>
-              <a:rPr lang="en-US" dirty="0"/>
-              <a:t>Began working on 3-legged Authentication</a:t>
-            </a:r>
-          </a:p>
-          <a:p>
-            <a:r>
-              <a:rPr lang="en-US" dirty="0"/>
-              <a:t>Found this would be very hard to do from scratch</a:t>
-            </a:r>
-          </a:p>
-          <a:p>
-            <a:r>
-              <a:rPr lang="en-US" dirty="0"/>
-              <a:t>Found an API that did exactly what we want</a:t>
-            </a:r>
-          </a:p>
-          <a:p>
-            <a:r>
-              <a:rPr lang="en-US" dirty="0"/>
-              <a:t>Spoke with Kean about the API we found and decided it would be best to integrate that</a:t>
-            </a:r>
-          </a:p>
-          <a:p>
-            <a:endParaRPr lang="en-US" dirty="0"/>
+              <a:t>Troubles setting up file bucket (never used curl before)</a:t>
+            </a:r>
+          </a:p>
+          <a:p>
+            <a:r>
+              <a:rPr lang="en-US" dirty="0"/>
+              <a:t>Got the bucket setup that will hold the files</a:t>
+            </a:r>
+          </a:p>
+          <a:p>
+            <a:r>
+              <a:rPr lang="en-US" dirty="0"/>
+              <a:t>Met with Kean and Patti</a:t>
+            </a:r>
           </a:p>
         </p:txBody>
       </p:sp>
     </p:spTree>
     <p:extLst>
       <p:ext uri="{BB962C8B-B14F-4D97-AF65-F5344CB8AC3E}">
-        <p14:creationId xmlns:p14="http://schemas.microsoft.com/office/powerpoint/2010/main" val="270471938"/>
+        <p14:creationId xmlns:p14="http://schemas.microsoft.com/office/powerpoint/2010/main" val="1610455051"/>
       </p:ext>
     </p:extLst>
   </p:cSld>
@@ -4823,7 +4849,7 @@
           <a:p>
             <a:r>
               <a:rPr lang="en-US" dirty="0"/>
-              <a:t>Winter Week 5</a:t>
+              <a:t>Winter Week 4</a:t>
             </a:r>
           </a:p>
         </p:txBody>
@@ -4845,27 +4871,42 @@
           <a:p>
             <a:r>
               <a:rPr lang="en-US" dirty="0"/>
-              <a:t>Began Integration of API</a:t>
-            </a:r>
-          </a:p>
-          <a:p>
-            <a:r>
-              <a:rPr lang="en-US" dirty="0"/>
-              <a:t>Ran into many problems with the integration</a:t>
-            </a:r>
-          </a:p>
-          <a:p>
-            <a:r>
-              <a:rPr lang="en-US" dirty="0"/>
-              <a:t>Kean suggested that he could bring in the person that created the API to help</a:t>
-            </a:r>
+              <a:t>Local file restriction complete</a:t>
+            </a:r>
+          </a:p>
+          <a:p>
+            <a:r>
+              <a:rPr lang="en-US" dirty="0"/>
+              <a:t>Began working on 3-legged Authentication</a:t>
+            </a:r>
+          </a:p>
+          <a:p>
+            <a:r>
+              <a:rPr lang="en-US" dirty="0"/>
+              <a:t>Found this would be very hard to do from scratch</a:t>
+            </a:r>
+          </a:p>
+          <a:p>
+            <a:r>
+              <a:rPr lang="en-US" dirty="0"/>
+              <a:t>Found an API that did exactly what we want</a:t>
+            </a:r>
+          </a:p>
+          <a:p>
+            <a:r>
+              <a:rPr lang="en-US" dirty="0"/>
+              <a:t>Spoke with Kean about the API we found and decided it would be best to integrate that</a:t>
+            </a:r>
+          </a:p>
+          <a:p>
+            <a:endParaRPr lang="en-US" dirty="0"/>
           </a:p>
         </p:txBody>
       </p:sp>
     </p:spTree>
     <p:extLst>
       <p:ext uri="{BB962C8B-B14F-4D97-AF65-F5344CB8AC3E}">
-        <p14:creationId xmlns:p14="http://schemas.microsoft.com/office/powerpoint/2010/main" val="4206706309"/>
+        <p14:creationId xmlns:p14="http://schemas.microsoft.com/office/powerpoint/2010/main" val="270471938"/>
       </p:ext>
     </p:extLst>
   </p:cSld>
@@ -4909,7 +4950,7 @@
           <a:p>
             <a:r>
               <a:rPr lang="en-US" dirty="0"/>
-              <a:t>Winter Week 6</a:t>
+              <a:t>Winter Week 5</a:t>
             </a:r>
           </a:p>
         </p:txBody>
@@ -4931,13 +4972,19 @@
           <a:p>
             <a:r>
               <a:rPr lang="en-US" dirty="0"/>
-              <a:t>Continued to work on integration</a:t>
-            </a:r>
-          </a:p>
-          <a:p>
-            <a:r>
-              <a:rPr lang="en-US" dirty="0"/>
-              <a:t>Worked on revision for documents to reflect where the project is currently</a:t>
+              <a:t>Began Integration of API</a:t>
+            </a:r>
+          </a:p>
+          <a:p>
+            <a:r>
+              <a:rPr lang="en-US" dirty="0"/>
+              <a:t>Ran into many problems with the integration</a:t>
+            </a:r>
+          </a:p>
+          <a:p>
+            <a:r>
+              <a:rPr lang="en-US" dirty="0"/>
+              <a:t>Kean suggested that he could bring in the person that created the API to help</a:t>
             </a:r>
           </a:p>
         </p:txBody>
@@ -4945,7 +4992,7 @@
     </p:spTree>
     <p:extLst>
       <p:ext uri="{BB962C8B-B14F-4D97-AF65-F5344CB8AC3E}">
-        <p14:creationId xmlns:p14="http://schemas.microsoft.com/office/powerpoint/2010/main" val="2635992290"/>
+        <p14:creationId xmlns:p14="http://schemas.microsoft.com/office/powerpoint/2010/main" val="4206706309"/>
       </p:ext>
     </p:extLst>
   </p:cSld>
@@ -5060,6 +5107,183 @@
 </file>
 
 <file path=ppt/slides/slide20.xml><?xml version="1.0" encoding="utf-8"?>
+<p:sld xmlns:a="http://schemas.openxmlformats.org/drawingml/2006/main" xmlns:r="http://schemas.openxmlformats.org/officeDocument/2006/relationships" xmlns:p="http://schemas.openxmlformats.org/presentationml/2006/main">
+  <p:cSld>
+    <p:spTree>
+      <p:nvGrpSpPr>
+        <p:cNvPr id="1" name=""/>
+        <p:cNvGrpSpPr/>
+        <p:nvPr/>
+      </p:nvGrpSpPr>
+      <p:grpSpPr>
+        <a:xfrm>
+          <a:off x="0" y="0"/>
+          <a:ext cx="0" cy="0"/>
+          <a:chOff x="0" y="0"/>
+          <a:chExt cx="0" cy="0"/>
+        </a:xfrm>
+      </p:grpSpPr>
+      <p:sp>
+        <p:nvSpPr>
+          <p:cNvPr id="2" name="Title 1"/>
+          <p:cNvSpPr>
+            <a:spLocks noGrp="1"/>
+          </p:cNvSpPr>
+          <p:nvPr>
+            <p:ph type="title"/>
+          </p:nvPr>
+        </p:nvSpPr>
+        <p:spPr/>
+        <p:txBody>
+          <a:bodyPr/>
+          <a:lstStyle/>
+          <a:p>
+            <a:r>
+              <a:rPr lang="en-US" dirty="0"/>
+              <a:t>Winter Week 6</a:t>
+            </a:r>
+          </a:p>
+        </p:txBody>
+      </p:sp>
+      <p:sp>
+        <p:nvSpPr>
+          <p:cNvPr id="3" name="Content Placeholder 2"/>
+          <p:cNvSpPr>
+            <a:spLocks noGrp="1"/>
+          </p:cNvSpPr>
+          <p:nvPr>
+            <p:ph idx="1"/>
+          </p:nvPr>
+        </p:nvSpPr>
+        <p:spPr/>
+        <p:txBody>
+          <a:bodyPr/>
+          <a:lstStyle/>
+          <a:p>
+            <a:r>
+              <a:rPr lang="en-US" dirty="0"/>
+              <a:t>Continued to work on integration</a:t>
+            </a:r>
+          </a:p>
+          <a:p>
+            <a:r>
+              <a:rPr lang="en-US" dirty="0"/>
+              <a:t>Worked on revision for documents to reflect where the project is currently</a:t>
+            </a:r>
+          </a:p>
+        </p:txBody>
+      </p:sp>
+    </p:spTree>
+    <p:extLst>
+      <p:ext uri="{BB962C8B-B14F-4D97-AF65-F5344CB8AC3E}">
+        <p14:creationId xmlns:p14="http://schemas.microsoft.com/office/powerpoint/2010/main" val="2635992290"/>
+      </p:ext>
+    </p:extLst>
+  </p:cSld>
+  <p:clrMapOvr>
+    <a:masterClrMapping/>
+  </p:clrMapOvr>
+</p:sld>
+</file>
+
+<file path=ppt/slides/slide21.xml><?xml version="1.0" encoding="utf-8"?>
+<p:sld xmlns:a="http://schemas.openxmlformats.org/drawingml/2006/main" xmlns:r="http://schemas.openxmlformats.org/officeDocument/2006/relationships" xmlns:p="http://schemas.openxmlformats.org/presentationml/2006/main">
+  <p:cSld>
+    <p:spTree>
+      <p:nvGrpSpPr>
+        <p:cNvPr id="1" name=""/>
+        <p:cNvGrpSpPr/>
+        <p:nvPr/>
+      </p:nvGrpSpPr>
+      <p:grpSpPr>
+        <a:xfrm>
+          <a:off x="0" y="0"/>
+          <a:ext cx="0" cy="0"/>
+          <a:chOff x="0" y="0"/>
+          <a:chExt cx="0" cy="0"/>
+        </a:xfrm>
+      </p:grpSpPr>
+      <p:sp>
+        <p:nvSpPr>
+          <p:cNvPr id="2" name="Title 1"/>
+          <p:cNvSpPr>
+            <a:spLocks noGrp="1"/>
+          </p:cNvSpPr>
+          <p:nvPr>
+            <p:ph type="title"/>
+          </p:nvPr>
+        </p:nvSpPr>
+        <p:spPr/>
+        <p:txBody>
+          <a:bodyPr/>
+          <a:lstStyle/>
+          <a:p>
+            <a:r>
+              <a:rPr lang="en-US" dirty="0"/>
+              <a:t>Problem &amp; Solution - Authentication</a:t>
+            </a:r>
+          </a:p>
+        </p:txBody>
+      </p:sp>
+      <p:sp>
+        <p:nvSpPr>
+          <p:cNvPr id="3" name="Content Placeholder 2"/>
+          <p:cNvSpPr>
+            <a:spLocks noGrp="1"/>
+          </p:cNvSpPr>
+          <p:nvPr>
+            <p:ph idx="1"/>
+          </p:nvPr>
+        </p:nvSpPr>
+        <p:spPr/>
+        <p:txBody>
+          <a:bodyPr/>
+          <a:lstStyle/>
+          <a:p>
+            <a:r>
+              <a:rPr lang="en-US" dirty="0"/>
+              <a:t>One of the biggest problems</a:t>
+            </a:r>
+          </a:p>
+          <a:p>
+            <a:r>
+              <a:rPr lang="en-US" dirty="0"/>
+              <a:t>Scratch code -&gt; adapting existing code</a:t>
+            </a:r>
+          </a:p>
+          <a:p>
+            <a:r>
+              <a:rPr lang="en-US" dirty="0"/>
+              <a:t>Not understanding code</a:t>
+            </a:r>
+          </a:p>
+          <a:p>
+            <a:r>
+              <a:rPr lang="en-US" dirty="0"/>
+              <a:t>Contact with </a:t>
+            </a:r>
+            <a:r>
+              <a:rPr lang="en-US"/>
+              <a:t>code creator</a:t>
+            </a:r>
+            <a:endParaRPr lang="en-US" dirty="0"/>
+          </a:p>
+        </p:txBody>
+      </p:sp>
+    </p:spTree>
+    <p:extLst>
+      <p:ext uri="{BB962C8B-B14F-4D97-AF65-F5344CB8AC3E}">
+        <p14:creationId xmlns:p14="http://schemas.microsoft.com/office/powerpoint/2010/main" val="341279170"/>
+      </p:ext>
+    </p:extLst>
+  </p:cSld>
+  <p:clrMapOvr>
+    <a:masterClrMapping/>
+  </p:clrMapOvr>
+</p:sld>
+</file>
+
+<file path=ppt/slides/slide22.xml><?xml version="1.0" encoding="utf-8"?>
 <p:sld xmlns:a="http://schemas.openxmlformats.org/drawingml/2006/main" xmlns:r="http://schemas.openxmlformats.org/officeDocument/2006/relationships" xmlns:p="http://schemas.openxmlformats.org/presentationml/2006/main">
   <p:cSld>
     <p:spTree>
@@ -5502,7 +5726,7 @@
 </p:sld>
 </file>
 
-<file path=ppt/slides/slide21.xml><?xml version="1.0" encoding="utf-8"?>
+<file path=ppt/slides/slide23.xml><?xml version="1.0" encoding="utf-8"?>
 <p:sld xmlns:a="http://schemas.openxmlformats.org/drawingml/2006/main" xmlns:r="http://schemas.openxmlformats.org/officeDocument/2006/relationships" xmlns:p="http://schemas.openxmlformats.org/presentationml/2006/main">
   <p:cSld>
     <p:spTree>
@@ -5592,7 +5816,7 @@
 </p:sld>
 </file>
 
-<file path=ppt/slides/slide22.xml><?xml version="1.0" encoding="utf-8"?>
+<file path=ppt/slides/slide24.xml><?xml version="1.0" encoding="utf-8"?>
 <p:sld xmlns:a="http://schemas.openxmlformats.org/drawingml/2006/main" xmlns:r="http://schemas.openxmlformats.org/officeDocument/2006/relationships" xmlns:p="http://schemas.openxmlformats.org/presentationml/2006/main">
   <p:cSld>
     <p:spTree>

</xml_diff>